<commit_message>
Changed sub-header Slide 32
</commit_message>
<xml_diff>
--- a/Requirements-Engineering/RE-L08_Traceability.pptx
+++ b/Requirements-Engineering/RE-L08_Traceability.pptx
@@ -120,37 +120,7 @@
               <a:rPr b="0" lang="en-US" sz="4400" spc="-1" strike="noStrike">
                 <a:latin typeface="DejaVu Sans"/>
               </a:rPr>
-              <a:t>Clic</a:t>
-            </a:r>
-            <a:r>
-              <a:rPr b="0" lang="en-US" sz="4400" spc="-1" strike="noStrike">
-                <a:latin typeface="DejaVu Sans"/>
-              </a:rPr>
-              <a:t>k to </a:t>
-            </a:r>
-            <a:r>
-              <a:rPr b="0" lang="en-US" sz="4400" spc="-1" strike="noStrike">
-                <a:latin typeface="DejaVu Sans"/>
-              </a:rPr>
-              <a:t>mov</a:t>
-            </a:r>
-            <a:r>
-              <a:rPr b="0" lang="en-US" sz="4400" spc="-1" strike="noStrike">
-                <a:latin typeface="DejaVu Sans"/>
-              </a:rPr>
-              <a:t>e </a:t>
-            </a:r>
-            <a:r>
-              <a:rPr b="0" lang="en-US" sz="4400" spc="-1" strike="noStrike">
-                <a:latin typeface="DejaVu Sans"/>
-              </a:rPr>
-              <a:t>the </a:t>
-            </a:r>
-            <a:r>
-              <a:rPr b="0" lang="en-US" sz="4400" spc="-1" strike="noStrike">
-                <a:latin typeface="DejaVu Sans"/>
-              </a:rPr>
-              <a:t>slide</a:t>
+              <a:t>Click to move the slide</a:t>
             </a:r>
             <a:endParaRPr b="0" lang="en-US" sz="4400" spc="-1" strike="noStrike">
               <a:latin typeface="DejaVu Sans"/>
@@ -190,25 +160,7 @@
               <a:rPr b="0" lang="en-US" sz="2000" spc="-1" strike="noStrike">
                 <a:latin typeface="DejaVu Sans"/>
               </a:rPr>
-              <a:t>Click to </a:t>
-            </a:r>
-            <a:r>
-              <a:rPr b="0" lang="en-US" sz="2000" spc="-1" strike="noStrike">
-                <a:latin typeface="DejaVu Sans"/>
-              </a:rPr>
-              <a:t>edit the </a:t>
-            </a:r>
-            <a:r>
-              <a:rPr b="0" lang="en-US" sz="2000" spc="-1" strike="noStrike">
-                <a:latin typeface="DejaVu Sans"/>
-              </a:rPr>
-              <a:t>notes </a:t>
-            </a:r>
-            <a:r>
-              <a:rPr b="0" lang="en-US" sz="2000" spc="-1" strike="noStrike">
-                <a:latin typeface="DejaVu Sans"/>
-              </a:rPr>
-              <a:t>format</a:t>
+              <a:t>Click to edit the notes format</a:t>
             </a:r>
             <a:endParaRPr b="0" lang="en-US" sz="2000" spc="-1" strike="noStrike">
               <a:latin typeface="DejaVu Sans"/>
@@ -393,7 +345,7 @@
             <a:pPr algn="r">
               <a:buNone/>
             </a:pPr>
-            <a:fld id="{3B9C3C02-35C2-4AE5-90D1-163EBA6A0616}" type="slidenum">
+            <a:fld id="{790B5C11-0BD4-4E67-A98D-C99EE52F2337}" type="slidenum">
               <a:rPr b="0" lang="en-US" sz="1400" spc="-1" strike="noStrike">
                 <a:latin typeface="DejaVu Serif"/>
               </a:rPr>
@@ -441,7 +393,7 @@
         <p:spPr>
           <a:xfrm>
             <a:off x="870120" y="1257480"/>
-            <a:ext cx="6028920" cy="3390480"/>
+            <a:ext cx="6028560" cy="3390120"/>
           </a:xfrm>
           <a:prstGeom prst="rect">
             <a:avLst/>
@@ -464,7 +416,7 @@
         <p:spPr>
           <a:xfrm>
             <a:off x="777960" y="4840200"/>
-            <a:ext cx="6212880" cy="3957120"/>
+            <a:ext cx="6212520" cy="3956760"/>
           </a:xfrm>
           <a:prstGeom prst="rect">
             <a:avLst/>
@@ -498,7 +450,7 @@
         <p:spPr>
           <a:xfrm>
             <a:off x="4402080" y="9553680"/>
-            <a:ext cx="3364920" cy="501120"/>
+            <a:ext cx="3364560" cy="500760"/>
           </a:xfrm>
           <a:prstGeom prst="rect">
             <a:avLst/>
@@ -530,11 +482,11 @@
               </a:lnSpc>
               <a:buNone/>
             </a:pPr>
-            <a:fld id="{999272A9-BC5B-480D-92C1-DDE15AB23A9E}" type="slidenum">
+            <a:fld id="{15C9340F-6930-411F-9AF1-E629429094AD}" type="slidenum">
               <a:rPr b="0" lang="de-DE" sz="1200" spc="-1" strike="noStrike">
                 <a:latin typeface="DejaVu Serif"/>
               </a:rPr>
-              <a:t>34</a:t>
+              <a:t>&lt;number&gt;</a:t>
             </a:fld>
             <a:endParaRPr b="0" lang="en-US" sz="1200" spc="-1" strike="noStrike">
               <a:latin typeface="DejaVu Serif"/>
@@ -577,7 +529,7 @@
         <p:spPr>
           <a:xfrm>
             <a:off x="870120" y="1257480"/>
-            <a:ext cx="6028920" cy="3390480"/>
+            <a:ext cx="6028560" cy="3390120"/>
           </a:xfrm>
           <a:prstGeom prst="rect">
             <a:avLst/>
@@ -600,7 +552,7 @@
         <p:spPr>
           <a:xfrm>
             <a:off x="777960" y="4840200"/>
-            <a:ext cx="6212880" cy="3957120"/>
+            <a:ext cx="6212520" cy="3956760"/>
           </a:xfrm>
           <a:prstGeom prst="rect">
             <a:avLst/>
@@ -634,7 +586,7 @@
         <p:spPr>
           <a:xfrm>
             <a:off x="4402080" y="9553680"/>
-            <a:ext cx="3364920" cy="501120"/>
+            <a:ext cx="3364560" cy="500760"/>
           </a:xfrm>
           <a:prstGeom prst="rect">
             <a:avLst/>
@@ -666,11 +618,11 @@
               </a:lnSpc>
               <a:buNone/>
             </a:pPr>
-            <a:fld id="{4CA90E0D-8F70-452A-80C8-0E05718FC0B7}" type="slidenum">
+            <a:fld id="{C04651F5-D9DE-4FDD-80D7-2081EE0A76E8}" type="slidenum">
               <a:rPr b="0" lang="de-DE" sz="1200" spc="-1" strike="noStrike">
                 <a:latin typeface="DejaVu Serif"/>
               </a:rPr>
-              <a:t>34</a:t>
+              <a:t>&lt;number&gt;</a:t>
             </a:fld>
             <a:endParaRPr b="0" lang="en-US" sz="1200" spc="-1" strike="noStrike">
               <a:latin typeface="DejaVu Serif"/>
@@ -713,7 +665,7 @@
         <p:spPr>
           <a:xfrm>
             <a:off x="870120" y="1257480"/>
-            <a:ext cx="6028920" cy="3390480"/>
+            <a:ext cx="6028560" cy="3390120"/>
           </a:xfrm>
           <a:prstGeom prst="rect">
             <a:avLst/>
@@ -736,7 +688,7 @@
         <p:spPr>
           <a:xfrm>
             <a:off x="777960" y="4840200"/>
-            <a:ext cx="6212880" cy="3957120"/>
+            <a:ext cx="6212520" cy="3956760"/>
           </a:xfrm>
           <a:prstGeom prst="rect">
             <a:avLst/>
@@ -770,7 +722,7 @@
         <p:spPr>
           <a:xfrm>
             <a:off x="4402080" y="9553680"/>
-            <a:ext cx="3364920" cy="501120"/>
+            <a:ext cx="3364560" cy="500760"/>
           </a:xfrm>
           <a:prstGeom prst="rect">
             <a:avLst/>
@@ -802,11 +754,11 @@
               </a:lnSpc>
               <a:buNone/>
             </a:pPr>
-            <a:fld id="{22859689-15E0-471D-AE07-71ECADA9FDD5}" type="slidenum">
+            <a:fld id="{2994AF71-4376-4B7E-AFDB-7FC1C074C828}" type="slidenum">
               <a:rPr b="0" lang="de-DE" sz="1200" spc="-1" strike="noStrike">
                 <a:latin typeface="DejaVu Serif"/>
               </a:rPr>
-              <a:t>34</a:t>
+              <a:t>&lt;number&gt;</a:t>
             </a:fld>
             <a:endParaRPr b="0" lang="en-US" sz="1200" spc="-1" strike="noStrike">
               <a:latin typeface="DejaVu Serif"/>
@@ -849,7 +801,7 @@
         <p:spPr>
           <a:xfrm>
             <a:off x="870120" y="1257480"/>
-            <a:ext cx="6028920" cy="3390480"/>
+            <a:ext cx="6028560" cy="3390120"/>
           </a:xfrm>
           <a:prstGeom prst="rect">
             <a:avLst/>
@@ -872,7 +824,7 @@
         <p:spPr>
           <a:xfrm>
             <a:off x="777960" y="4840200"/>
-            <a:ext cx="6212880" cy="3957120"/>
+            <a:ext cx="6212520" cy="3956760"/>
           </a:xfrm>
           <a:prstGeom prst="rect">
             <a:avLst/>
@@ -906,7 +858,7 @@
         <p:spPr>
           <a:xfrm>
             <a:off x="4402080" y="9553680"/>
-            <a:ext cx="3364920" cy="501120"/>
+            <a:ext cx="3364560" cy="500760"/>
           </a:xfrm>
           <a:prstGeom prst="rect">
             <a:avLst/>
@@ -938,11 +890,11 @@
               </a:lnSpc>
               <a:buNone/>
             </a:pPr>
-            <a:fld id="{22DDA685-0CDC-4819-B7ED-F4D6ADC6B7A0}" type="slidenum">
+            <a:fld id="{B229691B-5A8E-49A1-A313-B8A2ABA9E047}" type="slidenum">
               <a:rPr b="0" lang="de-DE" sz="1200" spc="-1" strike="noStrike">
                 <a:latin typeface="DejaVu Serif"/>
               </a:rPr>
-              <a:t>34</a:t>
+              <a:t>&lt;number&gt;</a:t>
             </a:fld>
             <a:endParaRPr b="0" lang="en-US" sz="1200" spc="-1" strike="noStrike">
               <a:latin typeface="DejaVu Serif"/>
@@ -7084,7 +7036,7 @@
         <p:spPr>
           <a:xfrm>
             <a:off x="11444760" y="0"/>
-            <a:ext cx="741600" cy="6850440"/>
+            <a:ext cx="741240" cy="6850080"/>
           </a:xfrm>
           <a:prstGeom prst="rect">
             <a:avLst/>
@@ -7114,7 +7066,7 @@
         <p:spPr>
           <a:xfrm>
             <a:off x="11438640" y="6453360"/>
-            <a:ext cx="758520" cy="363960"/>
+            <a:ext cx="758160" cy="363960"/>
           </a:xfrm>
           <a:prstGeom prst="rect">
             <a:avLst/>
@@ -7141,7 +7093,7 @@
               </a:lnSpc>
               <a:buNone/>
             </a:pPr>
-            <a:fld id="{C8ADD4A6-62F6-4DC6-BA5A-A5AFB5ABFC4C}" type="slidenum">
+            <a:fld id="{B7C7D11A-CF28-4140-AD12-0352DF5A40D6}" type="slidenum">
               <a:rPr b="0" lang="en-US" sz="1800" spc="-1" strike="noStrike">
                 <a:solidFill>
                   <a:srgbClr val="808080"/>
@@ -7166,7 +7118,7 @@
         <p:spPr>
           <a:xfrm>
             <a:off x="912240" y="1268280"/>
-            <a:ext cx="9208440" cy="361800"/>
+            <a:ext cx="9208080" cy="361440"/>
           </a:xfrm>
           <a:prstGeom prst="rect">
             <a:avLst/>
@@ -7196,7 +7148,7 @@
         <p:spPr>
           <a:xfrm>
             <a:off x="0" y="0"/>
-            <a:ext cx="3052440" cy="562320"/>
+            <a:ext cx="3052080" cy="561960"/>
           </a:xfrm>
           <a:prstGeom prst="rect">
             <a:avLst/>
@@ -7219,7 +7171,7 @@
         <p:spPr>
           <a:xfrm>
             <a:off x="7430400" y="134640"/>
-            <a:ext cx="3698280" cy="514440"/>
+            <a:ext cx="3697920" cy="514080"/>
           </a:xfrm>
           <a:prstGeom prst="rect">
             <a:avLst/>
@@ -7238,7 +7190,7 @@
         <p:spPr>
           <a:xfrm>
             <a:off x="912240" y="1268280"/>
-            <a:ext cx="9208440" cy="361800"/>
+            <a:ext cx="9208080" cy="361440"/>
           </a:xfrm>
           <a:prstGeom prst="rect">
             <a:avLst/>
@@ -7264,7 +7216,7 @@
         <p:spPr>
           <a:xfrm>
             <a:off x="11444760" y="0"/>
-            <a:ext cx="741600" cy="6850440"/>
+            <a:ext cx="741240" cy="6850080"/>
           </a:xfrm>
           <a:prstGeom prst="rect">
             <a:avLst/>
@@ -7294,7 +7246,7 @@
         <p:spPr>
           <a:xfrm>
             <a:off x="0" y="6646680"/>
-            <a:ext cx="12187800" cy="211320"/>
+            <a:ext cx="12187440" cy="211320"/>
           </a:xfrm>
           <a:prstGeom prst="rect">
             <a:avLst/>
@@ -7372,49 +7324,7 @@
               <a:rPr b="0" lang="en-US" sz="4400" spc="-1" strike="noStrike">
                 <a:latin typeface="DejaVu Sans"/>
               </a:rPr>
-              <a:t>Clic</a:t>
-            </a:r>
-            <a:r>
-              <a:rPr b="0" lang="en-US" sz="4400" spc="-1" strike="noStrike">
-                <a:latin typeface="DejaVu Sans"/>
-              </a:rPr>
-              <a:t>k to </a:t>
-            </a:r>
-            <a:r>
-              <a:rPr b="0" lang="en-US" sz="4400" spc="-1" strike="noStrike">
-                <a:latin typeface="DejaVu Sans"/>
-              </a:rPr>
-              <a:t>edit </a:t>
-            </a:r>
-            <a:r>
-              <a:rPr b="0" lang="en-US" sz="4400" spc="-1" strike="noStrike">
-                <a:latin typeface="DejaVu Sans"/>
-              </a:rPr>
-              <a:t>the </a:t>
-            </a:r>
-            <a:r>
-              <a:rPr b="0" lang="en-US" sz="4400" spc="-1" strike="noStrike">
-                <a:latin typeface="DejaVu Sans"/>
-              </a:rPr>
-              <a:t>title </a:t>
-            </a:r>
-            <a:r>
-              <a:rPr b="0" lang="en-US" sz="4400" spc="-1" strike="noStrike">
-                <a:latin typeface="DejaVu Sans"/>
-              </a:rPr>
-              <a:t>text </a:t>
-            </a:r>
-            <a:r>
-              <a:rPr b="0" lang="en-US" sz="4400" spc="-1" strike="noStrike">
-                <a:latin typeface="DejaVu Sans"/>
-              </a:rPr>
-              <a:t>form</a:t>
-            </a:r>
-            <a:r>
-              <a:rPr b="0" lang="en-US" sz="4400" spc="-1" strike="noStrike">
-                <a:latin typeface="DejaVu Sans"/>
-              </a:rPr>
-              <a:t>at</a:t>
+              <a:t>Click to edit the title text format</a:t>
             </a:r>
             <a:endParaRPr b="0" lang="en-US" sz="4400" spc="-1" strike="noStrike">
               <a:latin typeface="DejaVu Sans"/>
@@ -7658,7 +7568,7 @@
         <p:spPr>
           <a:xfrm>
             <a:off x="11444760" y="0"/>
-            <a:ext cx="741600" cy="6850440"/>
+            <a:ext cx="741240" cy="6850080"/>
           </a:xfrm>
           <a:prstGeom prst="rect">
             <a:avLst/>
@@ -7688,7 +7598,7 @@
         <p:spPr>
           <a:xfrm>
             <a:off x="11438640" y="6453360"/>
-            <a:ext cx="758520" cy="363960"/>
+            <a:ext cx="758160" cy="363960"/>
           </a:xfrm>
           <a:prstGeom prst="rect">
             <a:avLst/>
@@ -7715,7 +7625,7 @@
               </a:lnSpc>
               <a:buNone/>
             </a:pPr>
-            <a:fld id="{036E707F-2372-4F08-B85D-F40D6B19BBD5}" type="slidenum">
+            <a:fld id="{08CE2843-75A0-4CC4-955F-40C7626FD524}" type="slidenum">
               <a:rPr b="0" lang="en-US" sz="1800" spc="-1" strike="noStrike">
                 <a:solidFill>
                   <a:srgbClr val="808080"/>
@@ -7740,7 +7650,7 @@
         <p:spPr>
           <a:xfrm>
             <a:off x="912240" y="1268280"/>
-            <a:ext cx="9208440" cy="361800"/>
+            <a:ext cx="9208080" cy="361440"/>
           </a:xfrm>
           <a:prstGeom prst="rect">
             <a:avLst/>
@@ -7770,7 +7680,7 @@
         <p:spPr>
           <a:xfrm>
             <a:off x="0" y="0"/>
-            <a:ext cx="3052440" cy="562320"/>
+            <a:ext cx="3052080" cy="561960"/>
           </a:xfrm>
           <a:prstGeom prst="rect">
             <a:avLst/>
@@ -7793,7 +7703,7 @@
         <p:spPr>
           <a:xfrm>
             <a:off x="7430400" y="134640"/>
-            <a:ext cx="3698280" cy="514440"/>
+            <a:ext cx="3697920" cy="514080"/>
           </a:xfrm>
           <a:prstGeom prst="rect">
             <a:avLst/>
@@ -7812,7 +7722,7 @@
         <p:spPr>
           <a:xfrm>
             <a:off x="912240" y="1268280"/>
-            <a:ext cx="9208440" cy="361800"/>
+            <a:ext cx="9208080" cy="361440"/>
           </a:xfrm>
           <a:prstGeom prst="rect">
             <a:avLst/>
@@ -7838,7 +7748,7 @@
         <p:spPr>
           <a:xfrm>
             <a:off x="11444760" y="0"/>
-            <a:ext cx="741600" cy="6850440"/>
+            <a:ext cx="741240" cy="6850080"/>
           </a:xfrm>
           <a:prstGeom prst="rect">
             <a:avLst/>
@@ -7868,7 +7778,7 @@
         <p:spPr>
           <a:xfrm>
             <a:off x="0" y="6646680"/>
-            <a:ext cx="12187800" cy="211320"/>
+            <a:ext cx="12187440" cy="211320"/>
           </a:xfrm>
           <a:prstGeom prst="rect">
             <a:avLst/>
@@ -7946,49 +7856,7 @@
               <a:rPr b="0" lang="en-US" sz="4400" spc="-1" strike="noStrike">
                 <a:latin typeface="DejaVu Sans"/>
               </a:rPr>
-              <a:t>Clic</a:t>
-            </a:r>
-            <a:r>
-              <a:rPr b="0" lang="en-US" sz="4400" spc="-1" strike="noStrike">
-                <a:latin typeface="DejaVu Sans"/>
-              </a:rPr>
-              <a:t>k to </a:t>
-            </a:r>
-            <a:r>
-              <a:rPr b="0" lang="en-US" sz="4400" spc="-1" strike="noStrike">
-                <a:latin typeface="DejaVu Sans"/>
-              </a:rPr>
-              <a:t>edit </a:t>
-            </a:r>
-            <a:r>
-              <a:rPr b="0" lang="en-US" sz="4400" spc="-1" strike="noStrike">
-                <a:latin typeface="DejaVu Sans"/>
-              </a:rPr>
-              <a:t>the </a:t>
-            </a:r>
-            <a:r>
-              <a:rPr b="0" lang="en-US" sz="4400" spc="-1" strike="noStrike">
-                <a:latin typeface="DejaVu Sans"/>
-              </a:rPr>
-              <a:t>title </a:t>
-            </a:r>
-            <a:r>
-              <a:rPr b="0" lang="en-US" sz="4400" spc="-1" strike="noStrike">
-                <a:latin typeface="DejaVu Sans"/>
-              </a:rPr>
-              <a:t>text </a:t>
-            </a:r>
-            <a:r>
-              <a:rPr b="0" lang="en-US" sz="4400" spc="-1" strike="noStrike">
-                <a:latin typeface="DejaVu Sans"/>
-              </a:rPr>
-              <a:t>form</a:t>
-            </a:r>
-            <a:r>
-              <a:rPr b="0" lang="en-US" sz="4400" spc="-1" strike="noStrike">
-                <a:latin typeface="DejaVu Sans"/>
-              </a:rPr>
-              <a:t>at</a:t>
+              <a:t>Click to edit the title text format</a:t>
             </a:r>
             <a:endParaRPr b="0" lang="en-US" sz="4400" spc="-1" strike="noStrike">
               <a:latin typeface="DejaVu Sans"/>
@@ -8232,7 +8100,7 @@
         <p:spPr>
           <a:xfrm>
             <a:off x="11444760" y="0"/>
-            <a:ext cx="741600" cy="6850440"/>
+            <a:ext cx="741240" cy="6850080"/>
           </a:xfrm>
           <a:prstGeom prst="rect">
             <a:avLst/>
@@ -8262,7 +8130,7 @@
         <p:spPr>
           <a:xfrm>
             <a:off x="11438640" y="6453360"/>
-            <a:ext cx="758520" cy="363960"/>
+            <a:ext cx="758160" cy="363960"/>
           </a:xfrm>
           <a:prstGeom prst="rect">
             <a:avLst/>
@@ -8289,7 +8157,7 @@
               </a:lnSpc>
               <a:buNone/>
             </a:pPr>
-            <a:fld id="{FE6DFCE8-6828-4B4A-A7FA-3C79D0A69E20}" type="slidenum">
+            <a:fld id="{06EFFE09-153D-41AA-9185-5E7EFB54DE29}" type="slidenum">
               <a:rPr b="0" lang="en-US" sz="1800" spc="-1" strike="noStrike">
                 <a:solidFill>
                   <a:srgbClr val="808080"/>
@@ -8314,7 +8182,7 @@
         <p:spPr>
           <a:xfrm>
             <a:off x="912240" y="1268280"/>
-            <a:ext cx="9208440" cy="361800"/>
+            <a:ext cx="9208080" cy="361440"/>
           </a:xfrm>
           <a:prstGeom prst="rect">
             <a:avLst/>
@@ -8344,7 +8212,7 @@
         <p:spPr>
           <a:xfrm>
             <a:off x="0" y="0"/>
-            <a:ext cx="3052440" cy="562320"/>
+            <a:ext cx="3052080" cy="561960"/>
           </a:xfrm>
           <a:prstGeom prst="rect">
             <a:avLst/>
@@ -8367,7 +8235,7 @@
         <p:spPr>
           <a:xfrm>
             <a:off x="7430400" y="134640"/>
-            <a:ext cx="3698280" cy="514440"/>
+            <a:ext cx="3697920" cy="514080"/>
           </a:xfrm>
           <a:prstGeom prst="rect">
             <a:avLst/>
@@ -8386,7 +8254,7 @@
         <p:spPr>
           <a:xfrm>
             <a:off x="11444760" y="1440"/>
-            <a:ext cx="741600" cy="6850440"/>
+            <a:ext cx="741240" cy="6850080"/>
           </a:xfrm>
           <a:prstGeom prst="rect">
             <a:avLst/>
@@ -8416,7 +8284,7 @@
         <p:spPr>
           <a:xfrm>
             <a:off x="11427480" y="6453360"/>
-            <a:ext cx="758520" cy="363960"/>
+            <a:ext cx="758160" cy="363960"/>
           </a:xfrm>
           <a:prstGeom prst="rect">
             <a:avLst/>
@@ -8443,7 +8311,7 @@
               </a:lnSpc>
               <a:buNone/>
             </a:pPr>
-            <a:fld id="{73EFE608-1721-426A-9991-258884FC95DB}" type="slidenum">
+            <a:fld id="{B871C37C-E2E8-46FF-9A50-2E9DA460C4C2}" type="slidenum">
               <a:rPr b="0" lang="en-US" sz="1800" spc="-1" strike="noStrike">
                 <a:solidFill>
                   <a:srgbClr val="808080"/>
@@ -8468,7 +8336,7 @@
         <p:spPr>
           <a:xfrm>
             <a:off x="0" y="6646680"/>
-            <a:ext cx="12187800" cy="211320"/>
+            <a:ext cx="12187440" cy="211320"/>
           </a:xfrm>
           <a:prstGeom prst="rect">
             <a:avLst/>
@@ -8546,49 +8414,7 @@
               <a:rPr b="0" lang="en-US" sz="4400" spc="-1" strike="noStrike">
                 <a:latin typeface="DejaVu Sans"/>
               </a:rPr>
-              <a:t>Clic</a:t>
-            </a:r>
-            <a:r>
-              <a:rPr b="0" lang="en-US" sz="4400" spc="-1" strike="noStrike">
-                <a:latin typeface="DejaVu Sans"/>
-              </a:rPr>
-              <a:t>k to </a:t>
-            </a:r>
-            <a:r>
-              <a:rPr b="0" lang="en-US" sz="4400" spc="-1" strike="noStrike">
-                <a:latin typeface="DejaVu Sans"/>
-              </a:rPr>
-              <a:t>edit </a:t>
-            </a:r>
-            <a:r>
-              <a:rPr b="0" lang="en-US" sz="4400" spc="-1" strike="noStrike">
-                <a:latin typeface="DejaVu Sans"/>
-              </a:rPr>
-              <a:t>the </a:t>
-            </a:r>
-            <a:r>
-              <a:rPr b="0" lang="en-US" sz="4400" spc="-1" strike="noStrike">
-                <a:latin typeface="DejaVu Sans"/>
-              </a:rPr>
-              <a:t>title </a:t>
-            </a:r>
-            <a:r>
-              <a:rPr b="0" lang="en-US" sz="4400" spc="-1" strike="noStrike">
-                <a:latin typeface="DejaVu Sans"/>
-              </a:rPr>
-              <a:t>text </a:t>
-            </a:r>
-            <a:r>
-              <a:rPr b="0" lang="en-US" sz="4400" spc="-1" strike="noStrike">
-                <a:latin typeface="DejaVu Sans"/>
-              </a:rPr>
-              <a:t>form</a:t>
-            </a:r>
-            <a:r>
-              <a:rPr b="0" lang="en-US" sz="4400" spc="-1" strike="noStrike">
-                <a:latin typeface="DejaVu Sans"/>
-              </a:rPr>
-              <a:t>at</a:t>
+              <a:t>Click to edit the title text format</a:t>
             </a:r>
             <a:endParaRPr b="0" lang="en-US" sz="4400" spc="-1" strike="noStrike">
               <a:latin typeface="DejaVu Sans"/>
@@ -8832,7 +8658,7 @@
         <p:spPr>
           <a:xfrm>
             <a:off x="11444760" y="0"/>
-            <a:ext cx="741600" cy="6850440"/>
+            <a:ext cx="741240" cy="6850080"/>
           </a:xfrm>
           <a:prstGeom prst="rect">
             <a:avLst/>
@@ -8862,7 +8688,7 @@
         <p:spPr>
           <a:xfrm>
             <a:off x="11438640" y="6453360"/>
-            <a:ext cx="758520" cy="363960"/>
+            <a:ext cx="758160" cy="363960"/>
           </a:xfrm>
           <a:prstGeom prst="rect">
             <a:avLst/>
@@ -8889,7 +8715,7 @@
               </a:lnSpc>
               <a:buNone/>
             </a:pPr>
-            <a:fld id="{BBE593CF-0ED2-4280-94E3-496CF05374CC}" type="slidenum">
+            <a:fld id="{03877EE1-BA3A-469B-B1A2-9C3FA79A9D02}" type="slidenum">
               <a:rPr b="0" lang="en-US" sz="1800" spc="-1" strike="noStrike">
                 <a:solidFill>
                   <a:srgbClr val="808080"/>
@@ -8914,7 +8740,7 @@
         <p:spPr>
           <a:xfrm>
             <a:off x="912240" y="1268280"/>
-            <a:ext cx="9208440" cy="361800"/>
+            <a:ext cx="9208080" cy="361440"/>
           </a:xfrm>
           <a:prstGeom prst="rect">
             <a:avLst/>
@@ -8944,7 +8770,7 @@
         <p:spPr>
           <a:xfrm>
             <a:off x="0" y="0"/>
-            <a:ext cx="3052440" cy="562320"/>
+            <a:ext cx="3052080" cy="561960"/>
           </a:xfrm>
           <a:prstGeom prst="rect">
             <a:avLst/>
@@ -8967,7 +8793,7 @@
         <p:spPr>
           <a:xfrm>
             <a:off x="7430400" y="134640"/>
-            <a:ext cx="3698280" cy="514440"/>
+            <a:ext cx="3697920" cy="514080"/>
           </a:xfrm>
           <a:prstGeom prst="rect">
             <a:avLst/>
@@ -8986,7 +8812,7 @@
         <p:spPr>
           <a:xfrm>
             <a:off x="11444760" y="1440"/>
-            <a:ext cx="741600" cy="6850440"/>
+            <a:ext cx="741240" cy="6850080"/>
           </a:xfrm>
           <a:prstGeom prst="rect">
             <a:avLst/>
@@ -9016,7 +8842,7 @@
         <p:spPr>
           <a:xfrm>
             <a:off x="11427480" y="6453360"/>
-            <a:ext cx="758520" cy="363960"/>
+            <a:ext cx="758160" cy="363960"/>
           </a:xfrm>
           <a:prstGeom prst="rect">
             <a:avLst/>
@@ -9043,7 +8869,7 @@
               </a:lnSpc>
               <a:buNone/>
             </a:pPr>
-            <a:fld id="{892036C5-4D55-402D-A76D-1D0876EE629B}" type="slidenum">
+            <a:fld id="{89B63794-CE62-47DA-BFCB-B05687957345}" type="slidenum">
               <a:rPr b="0" lang="en-US" sz="1800" spc="-1" strike="noStrike">
                 <a:solidFill>
                   <a:srgbClr val="808080"/>
@@ -9068,7 +8894,7 @@
         <p:spPr>
           <a:xfrm>
             <a:off x="0" y="6646680"/>
-            <a:ext cx="12187800" cy="211320"/>
+            <a:ext cx="12187440" cy="211320"/>
           </a:xfrm>
           <a:prstGeom prst="rect">
             <a:avLst/>
@@ -9146,49 +8972,7 @@
               <a:rPr b="0" lang="en-US" sz="4400" spc="-1" strike="noStrike">
                 <a:latin typeface="DejaVu Sans"/>
               </a:rPr>
-              <a:t>Clic</a:t>
-            </a:r>
-            <a:r>
-              <a:rPr b="0" lang="en-US" sz="4400" spc="-1" strike="noStrike">
-                <a:latin typeface="DejaVu Sans"/>
-              </a:rPr>
-              <a:t>k to </a:t>
-            </a:r>
-            <a:r>
-              <a:rPr b="0" lang="en-US" sz="4400" spc="-1" strike="noStrike">
-                <a:latin typeface="DejaVu Sans"/>
-              </a:rPr>
-              <a:t>edit </a:t>
-            </a:r>
-            <a:r>
-              <a:rPr b="0" lang="en-US" sz="4400" spc="-1" strike="noStrike">
-                <a:latin typeface="DejaVu Sans"/>
-              </a:rPr>
-              <a:t>the </a:t>
-            </a:r>
-            <a:r>
-              <a:rPr b="0" lang="en-US" sz="4400" spc="-1" strike="noStrike">
-                <a:latin typeface="DejaVu Sans"/>
-              </a:rPr>
-              <a:t>title </a:t>
-            </a:r>
-            <a:r>
-              <a:rPr b="0" lang="en-US" sz="4400" spc="-1" strike="noStrike">
-                <a:latin typeface="DejaVu Sans"/>
-              </a:rPr>
-              <a:t>text </a:t>
-            </a:r>
-            <a:r>
-              <a:rPr b="0" lang="en-US" sz="4400" spc="-1" strike="noStrike">
-                <a:latin typeface="DejaVu Sans"/>
-              </a:rPr>
-              <a:t>form</a:t>
-            </a:r>
-            <a:r>
-              <a:rPr b="0" lang="en-US" sz="4400" spc="-1" strike="noStrike">
-                <a:latin typeface="DejaVu Sans"/>
-              </a:rPr>
-              <a:t>at</a:t>
+              <a:t>Click to edit the title text format</a:t>
             </a:r>
             <a:endParaRPr b="0" lang="en-US" sz="4400" spc="-1" strike="noStrike">
               <a:latin typeface="DejaVu Sans"/>
@@ -9425,7 +9209,7 @@
         <p:spPr>
           <a:xfrm>
             <a:off x="527400" y="1412640"/>
-            <a:ext cx="10364400" cy="1150920"/>
+            <a:ext cx="10364040" cy="1150560"/>
           </a:xfrm>
           <a:prstGeom prst="rect">
             <a:avLst/>
@@ -9477,7 +9261,7 @@
         <p:spPr>
           <a:xfrm>
             <a:off x="527400" y="2852640"/>
-            <a:ext cx="10364400" cy="2371680"/>
+            <a:ext cx="10364040" cy="2371320"/>
           </a:xfrm>
           <a:prstGeom prst="rect">
             <a:avLst/>
@@ -9680,7 +9464,7 @@
         <p:spPr>
           <a:xfrm>
             <a:off x="542880" y="721800"/>
-            <a:ext cx="10357200" cy="497880"/>
+            <a:ext cx="10356840" cy="497520"/>
           </a:xfrm>
           <a:prstGeom prst="rect">
             <a:avLst/>
@@ -9732,7 +9516,7 @@
         <p:spPr>
           <a:xfrm>
             <a:off x="542880" y="1267200"/>
-            <a:ext cx="10357200" cy="497880"/>
+            <a:ext cx="10356840" cy="497520"/>
           </a:xfrm>
           <a:prstGeom prst="rect">
             <a:avLst/>
@@ -9784,7 +9568,7 @@
         <p:spPr>
           <a:xfrm>
             <a:off x="451800" y="1709280"/>
-            <a:ext cx="8224560" cy="4352760"/>
+            <a:ext cx="8224200" cy="4352400"/>
           </a:xfrm>
           <a:prstGeom prst="rect">
             <a:avLst/>
@@ -9810,7 +9594,7 @@
         <p:spPr>
           <a:xfrm>
             <a:off x="263520" y="6411600"/>
-            <a:ext cx="10919520" cy="226800"/>
+            <a:ext cx="10919160" cy="226800"/>
           </a:xfrm>
           <a:prstGeom prst="rect">
             <a:avLst/>
@@ -9896,7 +9680,7 @@
         <p:spPr>
           <a:xfrm>
             <a:off x="2892600" y="1768680"/>
-            <a:ext cx="5658120" cy="4462560"/>
+            <a:ext cx="5657760" cy="4462200"/>
           </a:xfrm>
           <a:prstGeom prst="rect">
             <a:avLst/>
@@ -9945,7 +9729,7 @@
         <p:spPr>
           <a:xfrm>
             <a:off x="335520" y="4406760"/>
-            <a:ext cx="10748880" cy="1357920"/>
+            <a:ext cx="10748520" cy="1357560"/>
           </a:xfrm>
           <a:prstGeom prst="rect">
             <a:avLst/>
@@ -9997,7 +9781,7 @@
         <p:spPr>
           <a:xfrm>
             <a:off x="335520" y="2906640"/>
-            <a:ext cx="10748880" cy="1495800"/>
+            <a:ext cx="10748520" cy="1495440"/>
           </a:xfrm>
           <a:prstGeom prst="rect">
             <a:avLst/>
@@ -10053,7 +9837,7 @@
         <p:spPr>
           <a:xfrm>
             <a:off x="542880" y="721800"/>
-            <a:ext cx="10357200" cy="497880"/>
+            <a:ext cx="10356840" cy="497520"/>
           </a:xfrm>
           <a:prstGeom prst="rect">
             <a:avLst/>
@@ -10105,7 +9889,7 @@
         <p:spPr>
           <a:xfrm>
             <a:off x="542880" y="1267200"/>
-            <a:ext cx="10357200" cy="497880"/>
+            <a:ext cx="10356840" cy="497520"/>
           </a:xfrm>
           <a:prstGeom prst="rect">
             <a:avLst/>
@@ -10157,7 +9941,7 @@
         <p:spPr>
           <a:xfrm>
             <a:off x="451800" y="1709280"/>
-            <a:ext cx="8224560" cy="4352760"/>
+            <a:ext cx="8224200" cy="4352400"/>
           </a:xfrm>
           <a:prstGeom prst="rect">
             <a:avLst/>
@@ -10187,7 +9971,7 @@
         <p:spPr>
           <a:xfrm>
             <a:off x="684720" y="3077280"/>
-            <a:ext cx="10073520" cy="1195560"/>
+            <a:ext cx="10073160" cy="1195200"/>
           </a:xfrm>
           <a:prstGeom prst="rect">
             <a:avLst/>
@@ -10206,7 +9990,7 @@
         <p:spPr>
           <a:xfrm>
             <a:off x="263520" y="6411600"/>
-            <a:ext cx="10919520" cy="226800"/>
+            <a:ext cx="10919160" cy="226800"/>
           </a:xfrm>
           <a:prstGeom prst="rect">
             <a:avLst/>
@@ -10298,7 +10082,7 @@
         <p:spPr>
           <a:xfrm>
             <a:off x="542880" y="721800"/>
-            <a:ext cx="10357200" cy="497880"/>
+            <a:ext cx="10356840" cy="497520"/>
           </a:xfrm>
           <a:prstGeom prst="rect">
             <a:avLst/>
@@ -10350,7 +10134,7 @@
         <p:spPr>
           <a:xfrm>
             <a:off x="542880" y="1267200"/>
-            <a:ext cx="10357200" cy="497880"/>
+            <a:ext cx="10356840" cy="497520"/>
           </a:xfrm>
           <a:prstGeom prst="rect">
             <a:avLst/>
@@ -10402,7 +10186,7 @@
         <p:spPr>
           <a:xfrm>
             <a:off x="451800" y="1709280"/>
-            <a:ext cx="8224560" cy="4352760"/>
+            <a:ext cx="8224200" cy="4352400"/>
           </a:xfrm>
           <a:prstGeom prst="rect">
             <a:avLst/>
@@ -10432,7 +10216,7 @@
         <p:spPr>
           <a:xfrm>
             <a:off x="609480" y="1769400"/>
-            <a:ext cx="10587600" cy="4855680"/>
+            <a:ext cx="10587240" cy="4855320"/>
           </a:xfrm>
           <a:prstGeom prst="rect">
             <a:avLst/>
@@ -10676,7 +10460,7 @@
         <p:spPr>
           <a:xfrm>
             <a:off x="542880" y="721800"/>
-            <a:ext cx="10357200" cy="497880"/>
+            <a:ext cx="10356840" cy="497520"/>
           </a:xfrm>
           <a:prstGeom prst="rect">
             <a:avLst/>
@@ -10728,7 +10512,7 @@
         <p:spPr>
           <a:xfrm>
             <a:off x="542880" y="1267200"/>
-            <a:ext cx="10357200" cy="497880"/>
+            <a:ext cx="10356840" cy="497520"/>
           </a:xfrm>
           <a:prstGeom prst="rect">
             <a:avLst/>
@@ -10780,7 +10564,7 @@
         <p:spPr>
           <a:xfrm>
             <a:off x="451800" y="1709280"/>
-            <a:ext cx="8224560" cy="4352760"/>
+            <a:ext cx="8224200" cy="4352400"/>
           </a:xfrm>
           <a:prstGeom prst="rect">
             <a:avLst/>
@@ -10810,7 +10594,7 @@
         <p:spPr>
           <a:xfrm>
             <a:off x="609480" y="1769400"/>
-            <a:ext cx="10587600" cy="4855680"/>
+            <a:ext cx="10587240" cy="4855320"/>
           </a:xfrm>
           <a:prstGeom prst="rect">
             <a:avLst/>
@@ -10975,7 +10759,7 @@
         <p:spPr>
           <a:xfrm>
             <a:off x="263520" y="6411600"/>
-            <a:ext cx="10919520" cy="226800"/>
+            <a:ext cx="10919160" cy="226800"/>
           </a:xfrm>
           <a:prstGeom prst="rect">
             <a:avLst/>
@@ -11067,7 +10851,7 @@
         <p:spPr>
           <a:xfrm>
             <a:off x="542880" y="721800"/>
-            <a:ext cx="10357200" cy="497880"/>
+            <a:ext cx="10356840" cy="497520"/>
           </a:xfrm>
           <a:prstGeom prst="rect">
             <a:avLst/>
@@ -11119,7 +10903,7 @@
         <p:spPr>
           <a:xfrm>
             <a:off x="542880" y="1267200"/>
-            <a:ext cx="10357200" cy="497880"/>
+            <a:ext cx="10356840" cy="497520"/>
           </a:xfrm>
           <a:prstGeom prst="rect">
             <a:avLst/>
@@ -11171,7 +10955,7 @@
         <p:spPr>
           <a:xfrm>
             <a:off x="451800" y="1709280"/>
-            <a:ext cx="8224560" cy="4352760"/>
+            <a:ext cx="8224200" cy="4352400"/>
           </a:xfrm>
           <a:prstGeom prst="rect">
             <a:avLst/>
@@ -11201,7 +10985,7 @@
         <p:spPr>
           <a:xfrm>
             <a:off x="609480" y="1769400"/>
-            <a:ext cx="10587600" cy="4855680"/>
+            <a:ext cx="10587240" cy="4855320"/>
           </a:xfrm>
           <a:prstGeom prst="rect">
             <a:avLst/>
@@ -11434,7 +11218,7 @@
         <p:spPr>
           <a:xfrm>
             <a:off x="263520" y="6411600"/>
-            <a:ext cx="10919520" cy="226800"/>
+            <a:ext cx="10919160" cy="226800"/>
           </a:xfrm>
           <a:prstGeom prst="rect">
             <a:avLst/>
@@ -11526,7 +11310,7 @@
         <p:spPr>
           <a:xfrm>
             <a:off x="542880" y="721800"/>
-            <a:ext cx="10357200" cy="497880"/>
+            <a:ext cx="10356840" cy="497520"/>
           </a:xfrm>
           <a:prstGeom prst="rect">
             <a:avLst/>
@@ -11578,7 +11362,7 @@
         <p:spPr>
           <a:xfrm>
             <a:off x="542880" y="1267200"/>
-            <a:ext cx="10357200" cy="497880"/>
+            <a:ext cx="10356840" cy="497520"/>
           </a:xfrm>
           <a:prstGeom prst="rect">
             <a:avLst/>
@@ -11630,7 +11414,7 @@
         <p:spPr>
           <a:xfrm>
             <a:off x="451800" y="1709280"/>
-            <a:ext cx="8224560" cy="4352760"/>
+            <a:ext cx="8224200" cy="4352400"/>
           </a:xfrm>
           <a:prstGeom prst="rect">
             <a:avLst/>
@@ -11660,7 +11444,7 @@
         <p:spPr>
           <a:xfrm>
             <a:off x="609480" y="1769400"/>
-            <a:ext cx="10587600" cy="4855680"/>
+            <a:ext cx="10587240" cy="4855320"/>
           </a:xfrm>
           <a:prstGeom prst="rect">
             <a:avLst/>
@@ -12071,7 +11855,7 @@
         <p:spPr>
           <a:xfrm>
             <a:off x="263520" y="6411600"/>
-            <a:ext cx="10919520" cy="226800"/>
+            <a:ext cx="10919160" cy="226800"/>
           </a:xfrm>
           <a:prstGeom prst="rect">
             <a:avLst/>
@@ -12163,7 +11947,7 @@
         <p:spPr>
           <a:xfrm>
             <a:off x="542880" y="721800"/>
-            <a:ext cx="10357200" cy="497880"/>
+            <a:ext cx="10356840" cy="497520"/>
           </a:xfrm>
           <a:prstGeom prst="rect">
             <a:avLst/>
@@ -12215,7 +11999,7 @@
         <p:spPr>
           <a:xfrm>
             <a:off x="542880" y="1267200"/>
-            <a:ext cx="10357200" cy="497880"/>
+            <a:ext cx="10356840" cy="497520"/>
           </a:xfrm>
           <a:prstGeom prst="rect">
             <a:avLst/>
@@ -12267,7 +12051,7 @@
         <p:spPr>
           <a:xfrm>
             <a:off x="451800" y="1709280"/>
-            <a:ext cx="8224560" cy="4352760"/>
+            <a:ext cx="8224200" cy="4352400"/>
           </a:xfrm>
           <a:prstGeom prst="rect">
             <a:avLst/>
@@ -12297,7 +12081,7 @@
         <p:spPr>
           <a:xfrm>
             <a:off x="609480" y="1769400"/>
-            <a:ext cx="10587600" cy="4855680"/>
+            <a:ext cx="10587240" cy="4855320"/>
           </a:xfrm>
           <a:prstGeom prst="rect">
             <a:avLst/>
@@ -12729,7 +12513,7 @@
         <p:spPr>
           <a:xfrm>
             <a:off x="263520" y="6411600"/>
-            <a:ext cx="10919520" cy="226800"/>
+            <a:ext cx="10919160" cy="226800"/>
           </a:xfrm>
           <a:prstGeom prst="rect">
             <a:avLst/>
@@ -12821,7 +12605,7 @@
         <p:spPr>
           <a:xfrm>
             <a:off x="542880" y="721800"/>
-            <a:ext cx="10357200" cy="497880"/>
+            <a:ext cx="10356840" cy="497520"/>
           </a:xfrm>
           <a:prstGeom prst="rect">
             <a:avLst/>
@@ -12873,7 +12657,7 @@
         <p:spPr>
           <a:xfrm>
             <a:off x="542880" y="1267200"/>
-            <a:ext cx="10357200" cy="497880"/>
+            <a:ext cx="10356840" cy="497520"/>
           </a:xfrm>
           <a:prstGeom prst="rect">
             <a:avLst/>
@@ -12925,7 +12709,7 @@
         <p:spPr>
           <a:xfrm>
             <a:off x="451800" y="1709280"/>
-            <a:ext cx="8224560" cy="4352760"/>
+            <a:ext cx="8224200" cy="4352400"/>
           </a:xfrm>
           <a:prstGeom prst="rect">
             <a:avLst/>
@@ -12955,7 +12739,7 @@
         <p:spPr>
           <a:xfrm>
             <a:off x="609480" y="1769400"/>
-            <a:ext cx="10587600" cy="4855680"/>
+            <a:ext cx="10587240" cy="4855320"/>
           </a:xfrm>
           <a:prstGeom prst="rect">
             <a:avLst/>
@@ -13277,6 +13061,74 @@
             </a:endParaRPr>
           </a:p>
           <a:p>
+            <a:pPr>
+              <a:lnSpc>
+                <a:spcPct val="100000"/>
+              </a:lnSpc>
+              <a:spcBef>
+                <a:spcPts val="1417"/>
+              </a:spcBef>
+              <a:buNone/>
+            </a:pPr>
+            <a:endParaRPr b="0" lang="en-US" sz="1800" spc="-1" strike="noStrike">
+              <a:latin typeface="DejaVu Sans"/>
+            </a:endParaRPr>
+          </a:p>
+          <a:p>
+            <a:pPr>
+              <a:lnSpc>
+                <a:spcPct val="100000"/>
+              </a:lnSpc>
+              <a:spcBef>
+                <a:spcPts val="1417"/>
+              </a:spcBef>
+              <a:buNone/>
+            </a:pPr>
+            <a:endParaRPr b="0" lang="en-US" sz="1800" spc="-1" strike="noStrike">
+              <a:latin typeface="DejaVu Sans"/>
+            </a:endParaRPr>
+          </a:p>
+          <a:p>
+            <a:pPr marL="216000" indent="-216000">
+              <a:lnSpc>
+                <a:spcPct val="100000"/>
+              </a:lnSpc>
+              <a:spcBef>
+                <a:spcPts val="1417"/>
+              </a:spcBef>
+              <a:buClr>
+                <a:srgbClr val="008c4f"/>
+              </a:buClr>
+              <a:buSzPct val="80000"/>
+              <a:buFont typeface="Wingdings 2" charset="2"/>
+              <a:buChar char=""/>
+            </a:pPr>
+            <a:r>
+              <a:rPr b="0" lang="en-US" sz="2000" spc="-1" strike="noStrike" u="sng">
+                <a:solidFill>
+                  <a:srgbClr val="008c4f"/>
+                </a:solidFill>
+                <a:uFillTx/>
+                <a:latin typeface="DejaVu Sans"/>
+                <a:ea typeface="DejaVu Sans"/>
+              </a:rPr>
+              <a:t>refines</a:t>
+            </a:r>
+            <a:r>
+              <a:rPr b="0" lang="en-US" sz="2000" spc="-1" strike="noStrike">
+                <a:solidFill>
+                  <a:srgbClr val="000000"/>
+                </a:solidFill>
+                <a:latin typeface="DejaVu Sans"/>
+                <a:ea typeface="DejaVu Sans"/>
+              </a:rPr>
+              <a:t>:</a:t>
+            </a:r>
+            <a:endParaRPr b="0" lang="en-US" sz="2000" spc="-1" strike="noStrike">
+              <a:latin typeface="DejaVu Sans"/>
+            </a:endParaRPr>
+          </a:p>
+          <a:p>
             <a:pPr lvl="1" marL="432000" indent="-216000">
               <a:lnSpc>
                 <a:spcPct val="100000"/>
@@ -13291,7 +13143,87 @@
               <a:buFont typeface="OpenSymbol"/>
               <a:buChar char="—"/>
             </a:pPr>
+            <a:r>
+              <a:rPr b="0" lang="en-US" sz="1800" spc="-1" strike="noStrike">
+                <a:solidFill>
+                  <a:srgbClr val="000000"/>
+                </a:solidFill>
+                <a:latin typeface="DejaVu Sans"/>
+                <a:ea typeface="DejaVu Sans"/>
+              </a:rPr>
+              <a:t>Artefact </a:t>
+            </a:r>
+            <a:r>
+              <a:rPr b="1" lang="en-US" sz="1800" spc="-1" strike="noStrike">
+                <a:solidFill>
+                  <a:srgbClr val="000000"/>
+                </a:solidFill>
+                <a:latin typeface="DejaVu Sans"/>
+                <a:ea typeface="DejaVu Sans"/>
+              </a:rPr>
+              <a:t>A</a:t>
+            </a:r>
+            <a:r>
+              <a:rPr b="0" lang="en-US" sz="1800" spc="-1" strike="noStrike">
+                <a:solidFill>
+                  <a:srgbClr val="000000"/>
+                </a:solidFill>
+                <a:latin typeface="DejaVu Sans"/>
+                <a:ea typeface="DejaVu Sans"/>
+              </a:rPr>
+              <a:t> refines artefact </a:t>
+            </a:r>
+            <a:r>
+              <a:rPr b="1" lang="en-US" sz="1800" spc="-1" strike="noStrike">
+                <a:solidFill>
+                  <a:srgbClr val="000000"/>
+                </a:solidFill>
+                <a:latin typeface="DejaVu Sans"/>
+                <a:ea typeface="DejaVu Sans"/>
+              </a:rPr>
+              <a:t>B</a:t>
+            </a:r>
             <a:endParaRPr b="0" lang="en-US" sz="1800" spc="-1" strike="noStrike">
+              <a:latin typeface="DejaVu Sans"/>
+            </a:endParaRPr>
+          </a:p>
+          <a:p>
+            <a:pPr marL="216000" indent="-216000">
+              <a:lnSpc>
+                <a:spcPct val="100000"/>
+              </a:lnSpc>
+              <a:spcBef>
+                <a:spcPts val="1417"/>
+              </a:spcBef>
+              <a:buClr>
+                <a:srgbClr val="008c4f"/>
+              </a:buClr>
+              <a:buSzPct val="80000"/>
+              <a:buFont typeface="Wingdings 2" charset="2"/>
+              <a:buChar char=""/>
+            </a:pPr>
+            <a:r>
+              <a:rPr b="0" lang="en-US" sz="2000" spc="-1" strike="noStrike" u="sng">
+                <a:solidFill>
+                  <a:srgbClr val="008c4f"/>
+                </a:solidFill>
+                <a:uFillTx/>
+                <a:latin typeface="DejaVu Sans"/>
+                <a:ea typeface="DejaVu Sans"/>
+              </a:rPr>
+              <a:t>derived</a:t>
+            </a:r>
+            <a:r>
+              <a:rPr b="0" lang="en-US" sz="2000" spc="-1" strike="noStrike">
+                <a:solidFill>
+                  <a:srgbClr val="000000"/>
+                </a:solidFill>
+                <a:latin typeface="DejaVu Sans"/>
+                <a:ea typeface="DejaVu Sans"/>
+              </a:rPr>
+              <a:t>:</a:t>
+            </a:r>
+            <a:endParaRPr b="0" lang="en-US" sz="2000" spc="-1" strike="noStrike">
               <a:latin typeface="DejaVu Sans"/>
             </a:endParaRPr>
           </a:p>
@@ -13310,164 +13242,6 @@
               <a:buFont typeface="OpenSymbol"/>
               <a:buChar char="—"/>
             </a:pPr>
-            <a:endParaRPr b="0" lang="en-US" sz="1800" spc="-1" strike="noStrike">
-              <a:latin typeface="DejaVu Sans"/>
-            </a:endParaRPr>
-          </a:p>
-          <a:p>
-            <a:pPr marL="216000" indent="-216000">
-              <a:lnSpc>
-                <a:spcPct val="100000"/>
-              </a:lnSpc>
-              <a:spcBef>
-                <a:spcPts val="1417"/>
-              </a:spcBef>
-              <a:buClr>
-                <a:srgbClr val="008c4f"/>
-              </a:buClr>
-              <a:buSzPct val="80000"/>
-              <a:buFont typeface="Wingdings 2" charset="2"/>
-              <a:buChar char=""/>
-            </a:pPr>
-            <a:r>
-              <a:rPr b="0" lang="en-US" sz="2000" spc="-1" strike="noStrike" u="sng">
-                <a:solidFill>
-                  <a:srgbClr val="008c4f"/>
-                </a:solidFill>
-                <a:uFillTx/>
-                <a:latin typeface="DejaVu Sans"/>
-                <a:ea typeface="DejaVu Sans"/>
-              </a:rPr>
-              <a:t>refines</a:t>
-            </a:r>
-            <a:r>
-              <a:rPr b="0" lang="en-US" sz="2000" spc="-1" strike="noStrike">
-                <a:solidFill>
-                  <a:srgbClr val="000000"/>
-                </a:solidFill>
-                <a:latin typeface="DejaVu Sans"/>
-                <a:ea typeface="DejaVu Sans"/>
-              </a:rPr>
-              <a:t>:</a:t>
-            </a:r>
-            <a:endParaRPr b="0" lang="en-US" sz="2000" spc="-1" strike="noStrike">
-              <a:latin typeface="DejaVu Sans"/>
-            </a:endParaRPr>
-          </a:p>
-          <a:p>
-            <a:pPr lvl="1" marL="432000" indent="-216000">
-              <a:lnSpc>
-                <a:spcPct val="100000"/>
-              </a:lnSpc>
-              <a:spcBef>
-                <a:spcPts val="1417"/>
-              </a:spcBef>
-              <a:buClr>
-                <a:srgbClr val="008c4f"/>
-              </a:buClr>
-              <a:buSzPct val="45000"/>
-              <a:buFont typeface="OpenSymbol"/>
-              <a:buChar char="—"/>
-            </a:pPr>
-            <a:r>
-              <a:rPr b="0" lang="en-US" sz="1800" spc="-1" strike="noStrike">
-                <a:solidFill>
-                  <a:srgbClr val="000000"/>
-                </a:solidFill>
-                <a:latin typeface="DejaVu Sans"/>
-                <a:ea typeface="DejaVu Sans"/>
-              </a:rPr>
-              <a:t>Artefact </a:t>
-            </a:r>
-            <a:r>
-              <a:rPr b="1" lang="en-US" sz="1800" spc="-1" strike="noStrike">
-                <a:solidFill>
-                  <a:srgbClr val="000000"/>
-                </a:solidFill>
-                <a:latin typeface="DejaVu Sans"/>
-                <a:ea typeface="DejaVu Sans"/>
-              </a:rPr>
-              <a:t>A</a:t>
-            </a:r>
-            <a:r>
-              <a:rPr b="0" lang="en-US" sz="1800" spc="-1" strike="noStrike">
-                <a:solidFill>
-                  <a:srgbClr val="000000"/>
-                </a:solidFill>
-                <a:latin typeface="DejaVu Sans"/>
-                <a:ea typeface="DejaVu Sans"/>
-              </a:rPr>
-              <a:t> refines artefact </a:t>
-            </a:r>
-            <a:r>
-              <a:rPr b="1" lang="en-US" sz="1800" spc="-1" strike="noStrike">
-                <a:solidFill>
-                  <a:srgbClr val="000000"/>
-                </a:solidFill>
-                <a:latin typeface="DejaVu Sans"/>
-                <a:ea typeface="DejaVu Sans"/>
-              </a:rPr>
-              <a:t>B</a:t>
-            </a:r>
-            <a:endParaRPr b="0" lang="en-US" sz="1800" spc="-1" strike="noStrike">
-              <a:latin typeface="DejaVu Sans"/>
-            </a:endParaRPr>
-          </a:p>
-          <a:p>
-            <a:pPr marL="216000" indent="-216000">
-              <a:lnSpc>
-                <a:spcPct val="100000"/>
-              </a:lnSpc>
-              <a:spcBef>
-                <a:spcPts val="1417"/>
-              </a:spcBef>
-              <a:buClr>
-                <a:srgbClr val="008c4f"/>
-              </a:buClr>
-              <a:buSzPct val="80000"/>
-              <a:buFont typeface="Wingdings 2" charset="2"/>
-              <a:buChar char=""/>
-            </a:pPr>
-            <a:r>
-              <a:rPr b="0" lang="en-US" sz="2000" spc="-1" strike="noStrike" u="sng">
-                <a:solidFill>
-                  <a:srgbClr val="008c4f"/>
-                </a:solidFill>
-                <a:uFillTx/>
-                <a:latin typeface="DejaVu Sans"/>
-                <a:ea typeface="DejaVu Sans"/>
-              </a:rPr>
-              <a:t>derived</a:t>
-            </a:r>
-            <a:r>
-              <a:rPr b="0" lang="en-US" sz="2000" spc="-1" strike="noStrike">
-                <a:solidFill>
-                  <a:srgbClr val="000000"/>
-                </a:solidFill>
-                <a:latin typeface="DejaVu Sans"/>
-                <a:ea typeface="DejaVu Sans"/>
-              </a:rPr>
-              <a:t>:</a:t>
-            </a:r>
-            <a:endParaRPr b="0" lang="en-US" sz="2000" spc="-1" strike="noStrike">
-              <a:latin typeface="DejaVu Sans"/>
-            </a:endParaRPr>
-          </a:p>
-          <a:p>
-            <a:pPr lvl="1" marL="432000" indent="-216000">
-              <a:lnSpc>
-                <a:spcPct val="100000"/>
-              </a:lnSpc>
-              <a:spcBef>
-                <a:spcPts val="1417"/>
-              </a:spcBef>
-              <a:buClr>
-                <a:srgbClr val="008c4f"/>
-              </a:buClr>
-              <a:buSzPct val="45000"/>
-              <a:buFont typeface="OpenSymbol"/>
-              <a:buChar char="—"/>
-            </a:pPr>
             <a:r>
               <a:rPr b="0" lang="en-US" sz="1800" spc="-1" strike="noStrike">
                 <a:solidFill>
@@ -13513,7 +13287,7 @@
         <p:spPr>
           <a:xfrm>
             <a:off x="268920" y="6496920"/>
-            <a:ext cx="10919520" cy="226800"/>
+            <a:ext cx="10919160" cy="226800"/>
           </a:xfrm>
           <a:prstGeom prst="rect">
             <a:avLst/>
@@ -13605,7 +13379,7 @@
         <p:spPr>
           <a:xfrm>
             <a:off x="542880" y="721800"/>
-            <a:ext cx="10357200" cy="497880"/>
+            <a:ext cx="10356840" cy="497520"/>
           </a:xfrm>
           <a:prstGeom prst="rect">
             <a:avLst/>
@@ -13657,7 +13431,7 @@
         <p:spPr>
           <a:xfrm>
             <a:off x="542880" y="1267200"/>
-            <a:ext cx="10357200" cy="497880"/>
+            <a:ext cx="10356840" cy="497520"/>
           </a:xfrm>
           <a:prstGeom prst="rect">
             <a:avLst/>
@@ -13709,7 +13483,7 @@
         <p:spPr>
           <a:xfrm>
             <a:off x="451800" y="1709280"/>
-            <a:ext cx="8224560" cy="4352760"/>
+            <a:ext cx="8224200" cy="4352400"/>
           </a:xfrm>
           <a:prstGeom prst="rect">
             <a:avLst/>
@@ -13739,7 +13513,7 @@
         <p:spPr>
           <a:xfrm>
             <a:off x="609480" y="1769400"/>
-            <a:ext cx="10587600" cy="4855680"/>
+            <a:ext cx="10587240" cy="4855320"/>
           </a:xfrm>
           <a:prstGeom prst="rect">
             <a:avLst/>
@@ -14081,7 +13855,7 @@
         <p:spPr>
           <a:xfrm>
             <a:off x="263520" y="6411600"/>
-            <a:ext cx="10919520" cy="226800"/>
+            <a:ext cx="10919160" cy="226800"/>
           </a:xfrm>
           <a:prstGeom prst="rect">
             <a:avLst/>
@@ -14173,7 +13947,7 @@
         <p:spPr>
           <a:xfrm>
             <a:off x="542880" y="721800"/>
-            <a:ext cx="10357200" cy="497880"/>
+            <a:ext cx="10356840" cy="497520"/>
           </a:xfrm>
           <a:prstGeom prst="rect">
             <a:avLst/>
@@ -14225,7 +13999,7 @@
         <p:spPr>
           <a:xfrm>
             <a:off x="542880" y="1267200"/>
-            <a:ext cx="10357200" cy="497880"/>
+            <a:ext cx="10356840" cy="497520"/>
           </a:xfrm>
           <a:prstGeom prst="rect">
             <a:avLst/>
@@ -14281,7 +14055,7 @@
         <p:spPr>
           <a:xfrm>
             <a:off x="542880" y="2387520"/>
-            <a:ext cx="10102320" cy="2079720"/>
+            <a:ext cx="10101960" cy="2079360"/>
           </a:xfrm>
           <a:prstGeom prst="rect">
             <a:avLst/>
@@ -14300,7 +14074,7 @@
         <p:spPr>
           <a:xfrm>
             <a:off x="8879760" y="2309760"/>
-            <a:ext cx="1838880" cy="2258640"/>
+            <a:ext cx="1838520" cy="2258280"/>
           </a:xfrm>
           <a:prstGeom prst="frame">
             <a:avLst>
@@ -14371,7 +14145,7 @@
         <p:spPr>
           <a:xfrm>
             <a:off x="542880" y="721800"/>
-            <a:ext cx="10357200" cy="497880"/>
+            <a:ext cx="10356840" cy="497520"/>
           </a:xfrm>
           <a:prstGeom prst="rect">
             <a:avLst/>
@@ -14423,7 +14197,7 @@
         <p:spPr>
           <a:xfrm>
             <a:off x="542880" y="1267200"/>
-            <a:ext cx="10357200" cy="497880"/>
+            <a:ext cx="10356840" cy="497520"/>
           </a:xfrm>
           <a:prstGeom prst="rect">
             <a:avLst/>
@@ -14475,7 +14249,7 @@
         <p:spPr>
           <a:xfrm>
             <a:off x="451800" y="1709280"/>
-            <a:ext cx="8224560" cy="4352760"/>
+            <a:ext cx="8224200" cy="4352400"/>
           </a:xfrm>
           <a:prstGeom prst="rect">
             <a:avLst/>
@@ -14505,7 +14279,7 @@
         <p:spPr>
           <a:xfrm>
             <a:off x="609480" y="1769400"/>
-            <a:ext cx="10587600" cy="4855680"/>
+            <a:ext cx="10587240" cy="4855320"/>
           </a:xfrm>
           <a:prstGeom prst="rect">
             <a:avLst/>
@@ -14787,7 +14561,7 @@
         <p:spPr>
           <a:xfrm>
             <a:off x="263520" y="6411600"/>
-            <a:ext cx="10919520" cy="226800"/>
+            <a:ext cx="10919160" cy="226800"/>
           </a:xfrm>
           <a:prstGeom prst="rect">
             <a:avLst/>
@@ -14879,7 +14653,7 @@
         <p:spPr>
           <a:xfrm>
             <a:off x="335520" y="4406760"/>
-            <a:ext cx="10748880" cy="1357920"/>
+            <a:ext cx="10748520" cy="1357560"/>
           </a:xfrm>
           <a:prstGeom prst="rect">
             <a:avLst/>
@@ -14931,7 +14705,7 @@
         <p:spPr>
           <a:xfrm>
             <a:off x="335520" y="2906640"/>
-            <a:ext cx="10748880" cy="1495800"/>
+            <a:ext cx="10748520" cy="1495440"/>
           </a:xfrm>
           <a:prstGeom prst="rect">
             <a:avLst/>
@@ -14987,7 +14761,7 @@
         <p:spPr>
           <a:xfrm>
             <a:off x="542880" y="721800"/>
-            <a:ext cx="10357200" cy="497880"/>
+            <a:ext cx="10356840" cy="497520"/>
           </a:xfrm>
           <a:prstGeom prst="rect">
             <a:avLst/>
@@ -15039,7 +14813,7 @@
         <p:spPr>
           <a:xfrm>
             <a:off x="542880" y="1267200"/>
-            <a:ext cx="10357200" cy="497880"/>
+            <a:ext cx="10356840" cy="497520"/>
           </a:xfrm>
           <a:prstGeom prst="rect">
             <a:avLst/>
@@ -15091,7 +14865,7 @@
         <p:spPr>
           <a:xfrm>
             <a:off x="451800" y="1709280"/>
-            <a:ext cx="8224560" cy="4352760"/>
+            <a:ext cx="8224200" cy="4352400"/>
           </a:xfrm>
           <a:prstGeom prst="rect">
             <a:avLst/>
@@ -15121,7 +14895,7 @@
         <p:spPr>
           <a:xfrm>
             <a:off x="609480" y="1769400"/>
-            <a:ext cx="10587600" cy="4855680"/>
+            <a:ext cx="10587240" cy="4855320"/>
           </a:xfrm>
           <a:prstGeom prst="rect">
             <a:avLst/>
@@ -15316,7 +15090,7 @@
         <p:spPr>
           <a:xfrm>
             <a:off x="542880" y="721800"/>
-            <a:ext cx="10357200" cy="497880"/>
+            <a:ext cx="10356840" cy="497520"/>
           </a:xfrm>
           <a:prstGeom prst="rect">
             <a:avLst/>
@@ -15368,7 +15142,7 @@
         <p:spPr>
           <a:xfrm>
             <a:off x="542880" y="1267200"/>
-            <a:ext cx="10357200" cy="497880"/>
+            <a:ext cx="10356840" cy="497520"/>
           </a:xfrm>
           <a:prstGeom prst="rect">
             <a:avLst/>
@@ -15420,7 +15194,7 @@
         <p:spPr>
           <a:xfrm>
             <a:off x="451800" y="1709280"/>
-            <a:ext cx="8224560" cy="4352760"/>
+            <a:ext cx="8224200" cy="4352400"/>
           </a:xfrm>
           <a:prstGeom prst="rect">
             <a:avLst/>
@@ -15450,7 +15224,7 @@
         <p:spPr>
           <a:xfrm>
             <a:off x="609480" y="1769400"/>
-            <a:ext cx="10587600" cy="4855680"/>
+            <a:ext cx="10587240" cy="4855320"/>
           </a:xfrm>
           <a:prstGeom prst="rect">
             <a:avLst/>
@@ -15513,7 +15287,7 @@
         <p:spPr>
           <a:xfrm>
             <a:off x="263520" y="6411600"/>
-            <a:ext cx="10919520" cy="226800"/>
+            <a:ext cx="10919160" cy="226800"/>
           </a:xfrm>
           <a:prstGeom prst="rect">
             <a:avLst/>
@@ -15575,7 +15349,7 @@
         <p:spPr>
           <a:xfrm>
             <a:off x="602640" y="3257640"/>
-            <a:ext cx="10580400" cy="1879560"/>
+            <a:ext cx="10580040" cy="1879200"/>
           </a:xfrm>
           <a:prstGeom prst="roundRect">
             <a:avLst>
@@ -15642,7 +15416,7 @@
         <p:spPr>
           <a:xfrm>
             <a:off x="542880" y="721800"/>
-            <a:ext cx="10357200" cy="497880"/>
+            <a:ext cx="10356840" cy="497520"/>
           </a:xfrm>
           <a:prstGeom prst="rect">
             <a:avLst/>
@@ -15694,7 +15468,7 @@
         <p:spPr>
           <a:xfrm>
             <a:off x="542880" y="1267200"/>
-            <a:ext cx="10357200" cy="497880"/>
+            <a:ext cx="10356840" cy="497520"/>
           </a:xfrm>
           <a:prstGeom prst="rect">
             <a:avLst/>
@@ -15746,7 +15520,7 @@
         <p:spPr>
           <a:xfrm>
             <a:off x="609480" y="1769400"/>
-            <a:ext cx="10587600" cy="4855680"/>
+            <a:ext cx="10587240" cy="4855320"/>
           </a:xfrm>
           <a:prstGeom prst="rect">
             <a:avLst/>
@@ -15981,7 +15755,7 @@
         <p:spPr>
           <a:xfrm>
             <a:off x="542880" y="2280240"/>
-            <a:ext cx="10580400" cy="1109160"/>
+            <a:ext cx="10580040" cy="1108800"/>
           </a:xfrm>
           <a:prstGeom prst="roundRect">
             <a:avLst>
@@ -16018,7 +15792,7 @@
         <p:spPr>
           <a:xfrm>
             <a:off x="542880" y="4100760"/>
-            <a:ext cx="10580400" cy="1109160"/>
+            <a:ext cx="10580040" cy="1108800"/>
           </a:xfrm>
           <a:prstGeom prst="roundRect">
             <a:avLst>
@@ -16055,7 +15829,7 @@
         <p:spPr>
           <a:xfrm>
             <a:off x="1145160" y="3526200"/>
-            <a:ext cx="3654000" cy="363960"/>
+            <a:ext cx="3653640" cy="363960"/>
           </a:xfrm>
           <a:prstGeom prst="rect">
             <a:avLst/>
@@ -16107,7 +15881,7 @@
         <p:spPr>
           <a:xfrm>
             <a:off x="1078560" y="2930400"/>
-            <a:ext cx="360" cy="1265040"/>
+            <a:ext cx="360" cy="1264680"/>
           </a:xfrm>
           <a:custGeom>
             <a:avLst/>
@@ -16155,7 +15929,7 @@
         <p:spPr>
           <a:xfrm>
             <a:off x="263520" y="6411600"/>
-            <a:ext cx="10919520" cy="226800"/>
+            <a:ext cx="10919160" cy="226800"/>
           </a:xfrm>
           <a:prstGeom prst="rect">
             <a:avLst/>
@@ -16247,7 +16021,7 @@
         <p:spPr>
           <a:xfrm>
             <a:off x="542880" y="721800"/>
-            <a:ext cx="10357200" cy="497880"/>
+            <a:ext cx="10356840" cy="497520"/>
           </a:xfrm>
           <a:prstGeom prst="rect">
             <a:avLst/>
@@ -16299,7 +16073,7 @@
         <p:spPr>
           <a:xfrm>
             <a:off x="542880" y="1267200"/>
-            <a:ext cx="10357200" cy="497880"/>
+            <a:ext cx="10356840" cy="497520"/>
           </a:xfrm>
           <a:prstGeom prst="rect">
             <a:avLst/>
@@ -16351,7 +16125,7 @@
         <p:spPr>
           <a:xfrm>
             <a:off x="451800" y="1709280"/>
-            <a:ext cx="8224560" cy="4352760"/>
+            <a:ext cx="8224200" cy="4352400"/>
           </a:xfrm>
           <a:prstGeom prst="rect">
             <a:avLst/>
@@ -16381,7 +16155,7 @@
         <p:spPr>
           <a:xfrm>
             <a:off x="609480" y="1769400"/>
-            <a:ext cx="10587600" cy="4855680"/>
+            <a:ext cx="10587240" cy="4855320"/>
           </a:xfrm>
           <a:prstGeom prst="rect">
             <a:avLst/>
@@ -16581,7 +16355,7 @@
         <p:spPr>
           <a:xfrm>
             <a:off x="542880" y="721800"/>
-            <a:ext cx="10357200" cy="497880"/>
+            <a:ext cx="10356840" cy="497520"/>
           </a:xfrm>
           <a:prstGeom prst="rect">
             <a:avLst/>
@@ -16633,7 +16407,7 @@
         <p:spPr>
           <a:xfrm>
             <a:off x="542880" y="1267200"/>
-            <a:ext cx="10357200" cy="497880"/>
+            <a:ext cx="10356840" cy="497520"/>
           </a:xfrm>
           <a:prstGeom prst="rect">
             <a:avLst/>
@@ -16685,7 +16459,7 @@
         <p:spPr>
           <a:xfrm>
             <a:off x="451800" y="1709280"/>
-            <a:ext cx="8224560" cy="4352760"/>
+            <a:ext cx="8224200" cy="4352400"/>
           </a:xfrm>
           <a:prstGeom prst="rect">
             <a:avLst/>
@@ -16711,7 +16485,7 @@
         <p:spPr>
           <a:xfrm>
             <a:off x="263520" y="6411600"/>
-            <a:ext cx="10919520" cy="226800"/>
+            <a:ext cx="10919160" cy="226800"/>
           </a:xfrm>
           <a:prstGeom prst="rect">
             <a:avLst/>
@@ -16777,7 +16551,7 @@
         <p:spPr>
           <a:xfrm>
             <a:off x="2750760" y="1865880"/>
-            <a:ext cx="5925600" cy="4400280"/>
+            <a:ext cx="5925240" cy="4399920"/>
           </a:xfrm>
           <a:prstGeom prst="rect">
             <a:avLst/>
@@ -16795,8 +16569,8 @@
         </p:nvSpPr>
         <p:spPr>
           <a:xfrm rot="16200000">
-            <a:off x="6162120" y="1932120"/>
-            <a:ext cx="68400" cy="60120"/>
+            <a:off x="6162120" y="1932480"/>
+            <a:ext cx="68040" cy="59760"/>
           </a:xfrm>
           <a:prstGeom prst="triangle">
             <a:avLst>
@@ -16835,8 +16609,8 @@
         </p:nvSpPr>
         <p:spPr>
           <a:xfrm rot="16200000">
-            <a:off x="3831120" y="1937520"/>
-            <a:ext cx="68400" cy="60120"/>
+            <a:off x="3831120" y="1937880"/>
+            <a:ext cx="68040" cy="59760"/>
           </a:xfrm>
           <a:prstGeom prst="triangle">
             <a:avLst>
@@ -16875,8 +16649,8 @@
         </p:nvSpPr>
         <p:spPr>
           <a:xfrm rot="16200000">
-            <a:off x="6027840" y="2426040"/>
-            <a:ext cx="68400" cy="60120"/>
+            <a:off x="6027840" y="2426400"/>
+            <a:ext cx="68040" cy="59760"/>
           </a:xfrm>
           <a:prstGeom prst="triangle">
             <a:avLst>
@@ -16946,7 +16720,7 @@
         <p:spPr>
           <a:xfrm>
             <a:off x="542880" y="721800"/>
-            <a:ext cx="10357200" cy="497880"/>
+            <a:ext cx="10356840" cy="497520"/>
           </a:xfrm>
           <a:prstGeom prst="rect">
             <a:avLst/>
@@ -16998,7 +16772,7 @@
         <p:spPr>
           <a:xfrm>
             <a:off x="542880" y="1267200"/>
-            <a:ext cx="10357200" cy="497880"/>
+            <a:ext cx="10356840" cy="497520"/>
           </a:xfrm>
           <a:prstGeom prst="rect">
             <a:avLst/>
@@ -17050,7 +16824,7 @@
         <p:spPr>
           <a:xfrm>
             <a:off x="263520" y="6411600"/>
-            <a:ext cx="10919520" cy="226800"/>
+            <a:ext cx="10919160" cy="226800"/>
           </a:xfrm>
           <a:prstGeom prst="rect">
             <a:avLst/>
@@ -17128,7 +16902,7 @@
               <a:tr h="475920">
                 <a:tc>
                   <a:txBody>
-                    <a:bodyPr lIns="90000" rIns="90000" tIns="46800" bIns="46800" anchor="ctr">
+                    <a:bodyPr lIns="90000" rIns="90000" anchor="ctr">
                       <a:noAutofit/>
                     </a:bodyPr>
                     <a:p>
@@ -17181,7 +16955,7 @@
                 </a:tc>
                 <a:tc>
                   <a:txBody>
-                    <a:bodyPr lIns="90000" rIns="90000" tIns="46800" bIns="46800" anchor="ctr">
+                    <a:bodyPr lIns="90000" rIns="90000" anchor="ctr">
                       <a:noAutofit/>
                     </a:bodyPr>
                     <a:p>
@@ -17234,7 +17008,7 @@
                 </a:tc>
                 <a:tc>
                   <a:txBody>
-                    <a:bodyPr lIns="90000" rIns="90000" tIns="46800" bIns="46800" anchor="ctr">
+                    <a:bodyPr lIns="90000" rIns="90000" anchor="ctr">
                       <a:noAutofit/>
                     </a:bodyPr>
                     <a:p>
@@ -17287,7 +17061,7 @@
                 </a:tc>
                 <a:tc>
                   <a:txBody>
-                    <a:bodyPr lIns="90000" rIns="90000" tIns="46800" bIns="46800" anchor="ctr">
+                    <a:bodyPr lIns="90000" rIns="90000" anchor="ctr">
                       <a:noAutofit/>
                     </a:bodyPr>
                     <a:p>
@@ -17340,7 +17114,7 @@
                 </a:tc>
                 <a:tc>
                   <a:txBody>
-                    <a:bodyPr lIns="90000" rIns="90000" tIns="46800" bIns="46800" anchor="ctr">
+                    <a:bodyPr lIns="90000" rIns="90000" anchor="ctr">
                       <a:noAutofit/>
                     </a:bodyPr>
                     <a:p>
@@ -17393,7 +17167,7 @@
                 </a:tc>
                 <a:tc>
                   <a:txBody>
-                    <a:bodyPr lIns="90000" rIns="90000" tIns="46800" bIns="46800" anchor="ctr">
+                    <a:bodyPr lIns="90000" rIns="90000" anchor="ctr">
                       <a:noAutofit/>
                     </a:bodyPr>
                     <a:p>
@@ -17448,7 +17222,7 @@
               <a:tr h="475920">
                 <a:tc>
                   <a:txBody>
-                    <a:bodyPr lIns="90000" rIns="90000" tIns="46800" bIns="46800" anchor="ctr">
+                    <a:bodyPr lIns="90000" rIns="90000" anchor="ctr">
                       <a:noAutofit/>
                     </a:bodyPr>
                     <a:p>
@@ -17638,7 +17412,7 @@
               <a:tr h="475920">
                 <a:tc>
                   <a:txBody>
-                    <a:bodyPr lIns="90000" rIns="90000" tIns="46800" bIns="46800" anchor="ctr">
+                    <a:bodyPr lIns="90000" rIns="90000" anchor="ctr">
                       <a:noAutofit/>
                     </a:bodyPr>
                     <a:p>
@@ -17828,7 +17602,7 @@
               <a:tr h="475920">
                 <a:tc>
                   <a:txBody>
-                    <a:bodyPr lIns="90000" rIns="90000" tIns="46800" bIns="46800" anchor="ctr">
+                    <a:bodyPr lIns="90000" rIns="90000" anchor="ctr">
                       <a:noAutofit/>
                     </a:bodyPr>
                     <a:p>
@@ -17935,7 +17709,7 @@
                 </a:tc>
                 <a:tc>
                   <a:txBody>
-                    <a:bodyPr lIns="90000" rIns="90000" tIns="46800" bIns="46800" anchor="ctr">
+                    <a:bodyPr lIns="90000" rIns="90000" anchor="ctr">
                       <a:noAutofit/>
                     </a:bodyPr>
                     <a:p>
@@ -18044,7 +17818,7 @@
               <a:tr h="475920">
                 <a:tc>
                   <a:txBody>
-                    <a:bodyPr lIns="90000" rIns="90000" tIns="46800" bIns="46800" anchor="ctr">
+                    <a:bodyPr lIns="90000" rIns="90000" anchor="ctr">
                       <a:noAutofit/>
                     </a:bodyPr>
                     <a:p>
@@ -18151,7 +17925,7 @@
                 </a:tc>
                 <a:tc>
                   <a:txBody>
-                    <a:bodyPr lIns="90000" rIns="90000" tIns="46800" bIns="46800" anchor="ctr">
+                    <a:bodyPr lIns="90000" rIns="90000" anchor="ctr">
                       <a:noAutofit/>
                     </a:bodyPr>
                     <a:p>
@@ -18260,7 +18034,7 @@
               <a:tr h="476640">
                 <a:tc>
                   <a:txBody>
-                    <a:bodyPr lIns="90000" rIns="90000" tIns="46800" bIns="46800" anchor="ctr">
+                    <a:bodyPr lIns="90000" rIns="90000" anchor="ctr">
                       <a:noAutofit/>
                     </a:bodyPr>
                     <a:p>
@@ -18460,7 +18234,7 @@
         <p:spPr>
           <a:xfrm>
             <a:off x="1456200" y="2734200"/>
-            <a:ext cx="233640" cy="2853000"/>
+            <a:ext cx="233280" cy="2852640"/>
           </a:xfrm>
           <a:prstGeom prst="leftBracket">
             <a:avLst>
@@ -18495,8 +18269,8 @@
         </p:nvSpPr>
         <p:spPr>
           <a:xfrm rot="5400000">
-            <a:off x="6970320" y="-1235160"/>
-            <a:ext cx="233640" cy="7419240"/>
+            <a:off x="6970680" y="-1235160"/>
+            <a:ext cx="233280" cy="7418880"/>
           </a:xfrm>
           <a:prstGeom prst="leftBracket">
             <a:avLst>
@@ -18532,7 +18306,7 @@
         <p:spPr>
           <a:xfrm>
             <a:off x="5811480" y="1957680"/>
-            <a:ext cx="2245320" cy="394560"/>
+            <a:ext cx="2244960" cy="394560"/>
           </a:xfrm>
           <a:prstGeom prst="rect">
             <a:avLst/>
@@ -18584,7 +18358,7 @@
         <p:spPr>
           <a:xfrm>
             <a:off x="0" y="3736080"/>
-            <a:ext cx="1581840" cy="699480"/>
+            <a:ext cx="1581480" cy="699480"/>
           </a:xfrm>
           <a:prstGeom prst="rect">
             <a:avLst/>
@@ -18666,7 +18440,7 @@
         <p:spPr>
           <a:xfrm>
             <a:off x="542880" y="721800"/>
-            <a:ext cx="10357200" cy="497880"/>
+            <a:ext cx="10356840" cy="497520"/>
           </a:xfrm>
           <a:prstGeom prst="rect">
             <a:avLst/>
@@ -18718,7 +18492,7 @@
         <p:spPr>
           <a:xfrm>
             <a:off x="542880" y="1267200"/>
-            <a:ext cx="10357200" cy="497880"/>
+            <a:ext cx="10356840" cy="497520"/>
           </a:xfrm>
           <a:prstGeom prst="rect">
             <a:avLst/>
@@ -18770,7 +18544,7 @@
         <p:spPr>
           <a:xfrm>
             <a:off x="263520" y="6411600"/>
-            <a:ext cx="10919520" cy="226800"/>
+            <a:ext cx="10919160" cy="226800"/>
           </a:xfrm>
           <a:prstGeom prst="rect">
             <a:avLst/>
@@ -18875,7 +18649,7 @@
                 </a:tc>
                 <a:tc>
                   <a:txBody>
-                    <a:bodyPr lIns="90000" rIns="90000" tIns="46800" bIns="46800" anchor="ctr">
+                    <a:bodyPr lIns="90000" rIns="90000" anchor="ctr">
                       <a:noAutofit/>
                     </a:bodyPr>
                     <a:p>
@@ -18928,7 +18702,7 @@
                 </a:tc>
                 <a:tc>
                   <a:txBody>
-                    <a:bodyPr lIns="90000" rIns="90000" tIns="46800" bIns="46800" anchor="ctr">
+                    <a:bodyPr lIns="90000" rIns="90000" anchor="ctr">
                       <a:noAutofit/>
                     </a:bodyPr>
                     <a:p>
@@ -18981,7 +18755,7 @@
                 </a:tc>
                 <a:tc>
                   <a:txBody>
-                    <a:bodyPr lIns="90000" rIns="90000" tIns="46800" bIns="46800" anchor="ctr">
+                    <a:bodyPr lIns="90000" rIns="90000" anchor="ctr">
                       <a:noAutofit/>
                     </a:bodyPr>
                     <a:p>
@@ -19034,7 +18808,7 @@
                 </a:tc>
                 <a:tc>
                   <a:txBody>
-                    <a:bodyPr lIns="90000" rIns="90000" tIns="46800" bIns="46800" anchor="ctr">
+                    <a:bodyPr lIns="90000" rIns="90000" anchor="ctr">
                       <a:noAutofit/>
                     </a:bodyPr>
                     <a:p>
@@ -19087,7 +18861,7 @@
                 </a:tc>
                 <a:tc>
                   <a:txBody>
-                    <a:bodyPr lIns="90000" rIns="90000" tIns="46800" bIns="46800" anchor="ctr">
+                    <a:bodyPr lIns="90000" rIns="90000" anchor="ctr">
                       <a:noAutofit/>
                     </a:bodyPr>
                     <a:p>
@@ -19142,7 +18916,7 @@
               <a:tr h="475920">
                 <a:tc>
                   <a:txBody>
-                    <a:bodyPr lIns="90000" rIns="90000" tIns="46800" bIns="46800" anchor="ctr">
+                    <a:bodyPr lIns="90000" rIns="90000" anchor="ctr">
                       <a:noAutofit/>
                     </a:bodyPr>
                     <a:p>
@@ -19195,7 +18969,7 @@
                 </a:tc>
                 <a:tc>
                   <a:txBody>
-                    <a:bodyPr lIns="90000" rIns="90000" tIns="46800" bIns="46800" anchor="ctr">
+                    <a:bodyPr lIns="90000" rIns="90000" anchor="ctr">
                       <a:noAutofit/>
                     </a:bodyPr>
                     <a:p>
@@ -19358,7 +19132,7 @@
               <a:tr h="475920">
                 <a:tc>
                   <a:txBody>
-                    <a:bodyPr lIns="90000" rIns="90000" tIns="46800" bIns="46800" anchor="ctr">
+                    <a:bodyPr lIns="90000" rIns="90000" anchor="ctr">
                       <a:noAutofit/>
                     </a:bodyPr>
                     <a:p>
@@ -19411,7 +19185,7 @@
                 </a:tc>
                 <a:tc>
                   <a:txBody>
-                    <a:bodyPr lIns="90000" rIns="90000" tIns="46800" bIns="46800" anchor="ctr">
+                    <a:bodyPr lIns="90000" rIns="90000" anchor="ctr">
                       <a:noAutofit/>
                     </a:bodyPr>
                     <a:p>
@@ -19464,7 +19238,7 @@
                 </a:tc>
                 <a:tc>
                   <a:txBody>
-                    <a:bodyPr lIns="90000" rIns="90000" tIns="46800" bIns="46800" anchor="ctr">
+                    <a:bodyPr lIns="90000" rIns="90000" anchor="ctr">
                       <a:noAutofit/>
                     </a:bodyPr>
                     <a:p>
@@ -19544,7 +19318,7 @@
                 </a:tc>
                 <a:tc>
                   <a:txBody>
-                    <a:bodyPr lIns="90000" rIns="90000" tIns="46800" bIns="46800" anchor="ctr">
+                    <a:bodyPr lIns="90000" rIns="90000" anchor="ctr">
                       <a:noAutofit/>
                     </a:bodyPr>
                     <a:p>
@@ -19626,7 +19400,7 @@
               <a:tr h="475920">
                 <a:tc>
                   <a:txBody>
-                    <a:bodyPr lIns="90000" rIns="90000" tIns="46800" bIns="46800" anchor="ctr">
+                    <a:bodyPr lIns="90000" rIns="90000" anchor="ctr">
                       <a:noAutofit/>
                     </a:bodyPr>
                     <a:p>
@@ -19706,7 +19480,7 @@
                 </a:tc>
                 <a:tc>
                   <a:txBody>
-                    <a:bodyPr lIns="90000" rIns="90000" tIns="46800" bIns="46800" anchor="ctr">
+                    <a:bodyPr lIns="90000" rIns="90000" anchor="ctr">
                       <a:noAutofit/>
                     </a:bodyPr>
                     <a:p>
@@ -19842,7 +19616,7 @@
               <a:tr h="475920">
                 <a:tc>
                   <a:txBody>
-                    <a:bodyPr lIns="90000" rIns="90000" tIns="46800" bIns="46800" anchor="ctr">
+                    <a:bodyPr lIns="90000" rIns="90000" anchor="ctr">
                       <a:noAutofit/>
                     </a:bodyPr>
                     <a:p>
@@ -19895,7 +19669,7 @@
                 </a:tc>
                 <a:tc>
                   <a:txBody>
-                    <a:bodyPr lIns="90000" rIns="90000" tIns="46800" bIns="46800" anchor="ctr">
+                    <a:bodyPr lIns="90000" rIns="90000" anchor="ctr">
                       <a:noAutofit/>
                     </a:bodyPr>
                     <a:p>
@@ -19975,7 +19749,7 @@
                 </a:tc>
                 <a:tc>
                   <a:txBody>
-                    <a:bodyPr lIns="90000" rIns="90000" tIns="46800" bIns="46800" anchor="ctr">
+                    <a:bodyPr lIns="90000" rIns="90000" anchor="ctr">
                       <a:noAutofit/>
                     </a:bodyPr>
                     <a:p>
@@ -20055,7 +19829,7 @@
                 </a:tc>
                 <a:tc>
                   <a:txBody>
-                    <a:bodyPr lIns="90000" rIns="90000" tIns="46800" bIns="46800" anchor="ctr">
+                    <a:bodyPr lIns="90000" rIns="90000" anchor="ctr">
                       <a:noAutofit/>
                     </a:bodyPr>
                     <a:p>
@@ -20110,7 +19884,7 @@
               <a:tr h="476640">
                 <a:tc>
                   <a:txBody>
-                    <a:bodyPr lIns="90000" rIns="90000" tIns="46800" bIns="46800" anchor="ctr">
+                    <a:bodyPr lIns="90000" rIns="90000" anchor="ctr">
                       <a:noAutofit/>
                     </a:bodyPr>
                     <a:p>
@@ -20190,7 +19964,7 @@
                 </a:tc>
                 <a:tc>
                   <a:txBody>
-                    <a:bodyPr lIns="90000" rIns="90000" tIns="46800" bIns="46800" anchor="ctr">
+                    <a:bodyPr lIns="90000" rIns="90000" anchor="ctr">
                       <a:noAutofit/>
                     </a:bodyPr>
                     <a:p>
@@ -20270,7 +20044,7 @@
                 </a:tc>
                 <a:tc>
                   <a:txBody>
-                    <a:bodyPr lIns="90000" rIns="90000" tIns="46800" bIns="46800" anchor="ctr">
+                    <a:bodyPr lIns="90000" rIns="90000" anchor="ctr">
                       <a:noAutofit/>
                     </a:bodyPr>
                     <a:p>
@@ -20362,7 +20136,7 @@
         <p:spPr>
           <a:xfrm>
             <a:off x="1456200" y="2734200"/>
-            <a:ext cx="233640" cy="2853000"/>
+            <a:ext cx="233280" cy="2852640"/>
           </a:xfrm>
           <a:prstGeom prst="leftBracket">
             <a:avLst>
@@ -20397,8 +20171,8 @@
         </p:nvSpPr>
         <p:spPr>
           <a:xfrm rot="5400000">
-            <a:off x="6970320" y="-1235160"/>
-            <a:ext cx="233640" cy="7419240"/>
+            <a:off x="6970680" y="-1235160"/>
+            <a:ext cx="233280" cy="7418880"/>
           </a:xfrm>
           <a:prstGeom prst="leftBracket">
             <a:avLst>
@@ -20434,7 +20208,7 @@
         <p:spPr>
           <a:xfrm>
             <a:off x="5811480" y="1957680"/>
-            <a:ext cx="2245320" cy="394560"/>
+            <a:ext cx="2244960" cy="394560"/>
           </a:xfrm>
           <a:prstGeom prst="rect">
             <a:avLst/>
@@ -20486,7 +20260,7 @@
         <p:spPr>
           <a:xfrm>
             <a:off x="0" y="3736080"/>
-            <a:ext cx="1581840" cy="699480"/>
+            <a:ext cx="1581480" cy="699480"/>
           </a:xfrm>
           <a:prstGeom prst="rect">
             <a:avLst/>
@@ -20568,7 +20342,7 @@
         <p:spPr>
           <a:xfrm>
             <a:off x="542880" y="721800"/>
-            <a:ext cx="10357200" cy="497880"/>
+            <a:ext cx="10356840" cy="497520"/>
           </a:xfrm>
           <a:prstGeom prst="rect">
             <a:avLst/>
@@ -20620,7 +20394,7 @@
         <p:spPr>
           <a:xfrm>
             <a:off x="542880" y="1267200"/>
-            <a:ext cx="10357200" cy="497880"/>
+            <a:ext cx="10356840" cy="497520"/>
           </a:xfrm>
           <a:prstGeom prst="rect">
             <a:avLst/>
@@ -20672,7 +20446,7 @@
         <p:spPr>
           <a:xfrm>
             <a:off x="451800" y="1709280"/>
-            <a:ext cx="8224560" cy="4352760"/>
+            <a:ext cx="8224200" cy="4352400"/>
           </a:xfrm>
           <a:prstGeom prst="rect">
             <a:avLst/>
@@ -20702,7 +20476,7 @@
         <p:spPr>
           <a:xfrm>
             <a:off x="609480" y="1769400"/>
-            <a:ext cx="10587600" cy="4855680"/>
+            <a:ext cx="10587240" cy="4855320"/>
           </a:xfrm>
           <a:prstGeom prst="rect">
             <a:avLst/>
@@ -20941,7 +20715,7 @@
         <p:spPr>
           <a:xfrm>
             <a:off x="542880" y="721800"/>
-            <a:ext cx="10357200" cy="497880"/>
+            <a:ext cx="10356840" cy="497520"/>
           </a:xfrm>
           <a:prstGeom prst="rect">
             <a:avLst/>
@@ -20993,7 +20767,7 @@
         <p:spPr>
           <a:xfrm>
             <a:off x="542880" y="1267200"/>
-            <a:ext cx="10357200" cy="497880"/>
+            <a:ext cx="10356840" cy="497520"/>
           </a:xfrm>
           <a:prstGeom prst="rect">
             <a:avLst/>
@@ -21045,7 +20819,7 @@
         <p:spPr>
           <a:xfrm>
             <a:off x="451800" y="1709280"/>
-            <a:ext cx="8224560" cy="4352760"/>
+            <a:ext cx="8224200" cy="4352400"/>
           </a:xfrm>
           <a:prstGeom prst="rect">
             <a:avLst/>
@@ -21199,7 +20973,7 @@
         <p:spPr>
           <a:xfrm>
             <a:off x="542880" y="721800"/>
-            <a:ext cx="10357200" cy="497880"/>
+            <a:ext cx="10356840" cy="497520"/>
           </a:xfrm>
           <a:prstGeom prst="rect">
             <a:avLst/>
@@ -21251,7 +21025,7 @@
         <p:spPr>
           <a:xfrm>
             <a:off x="542880" y="1267200"/>
-            <a:ext cx="10357200" cy="497880"/>
+            <a:ext cx="10356840" cy="497520"/>
           </a:xfrm>
           <a:prstGeom prst="rect">
             <a:avLst/>
@@ -21303,7 +21077,7 @@
         <p:spPr>
           <a:xfrm>
             <a:off x="451800" y="1709280"/>
-            <a:ext cx="8224560" cy="4352760"/>
+            <a:ext cx="8224200" cy="4352400"/>
           </a:xfrm>
           <a:prstGeom prst="rect">
             <a:avLst/>
@@ -21333,7 +21107,7 @@
         <p:spPr>
           <a:xfrm>
             <a:off x="609480" y="1769400"/>
-            <a:ext cx="10587600" cy="4855680"/>
+            <a:ext cx="10587240" cy="4855320"/>
           </a:xfrm>
           <a:prstGeom prst="rect">
             <a:avLst/>
@@ -21562,7 +21336,7 @@
         <p:spPr>
           <a:xfrm>
             <a:off x="542880" y="721800"/>
-            <a:ext cx="10357200" cy="497880"/>
+            <a:ext cx="10356840" cy="497520"/>
           </a:xfrm>
           <a:prstGeom prst="rect">
             <a:avLst/>
@@ -21614,7 +21388,7 @@
         <p:spPr>
           <a:xfrm>
             <a:off x="451800" y="1709280"/>
-            <a:ext cx="8224560" cy="4352760"/>
+            <a:ext cx="8224200" cy="4352400"/>
           </a:xfrm>
           <a:prstGeom prst="rect">
             <a:avLst/>
@@ -21640,7 +21414,7 @@
         <p:spPr>
           <a:xfrm>
             <a:off x="542880" y="1267200"/>
-            <a:ext cx="10357200" cy="497880"/>
+            <a:ext cx="10356840" cy="497520"/>
           </a:xfrm>
           <a:prstGeom prst="rect">
             <a:avLst/>
@@ -21696,7 +21470,7 @@
         <p:spPr>
           <a:xfrm>
             <a:off x="4218120" y="871560"/>
-            <a:ext cx="6681960" cy="5419800"/>
+            <a:ext cx="6681600" cy="5419440"/>
           </a:xfrm>
           <a:prstGeom prst="rect">
             <a:avLst/>
@@ -21715,7 +21489,7 @@
         <p:spPr>
           <a:xfrm>
             <a:off x="263520" y="6411600"/>
-            <a:ext cx="10919520" cy="226800"/>
+            <a:ext cx="10919160" cy="226800"/>
           </a:xfrm>
           <a:prstGeom prst="rect">
             <a:avLst/>
@@ -21807,7 +21581,7 @@
         <p:spPr>
           <a:xfrm>
             <a:off x="542880" y="721800"/>
-            <a:ext cx="10357200" cy="497880"/>
+            <a:ext cx="10356840" cy="497520"/>
           </a:xfrm>
           <a:prstGeom prst="rect">
             <a:avLst/>
@@ -21859,7 +21633,7 @@
         <p:spPr>
           <a:xfrm>
             <a:off x="542880" y="1267200"/>
-            <a:ext cx="10357200" cy="497880"/>
+            <a:ext cx="10356840" cy="497520"/>
           </a:xfrm>
           <a:prstGeom prst="rect">
             <a:avLst/>
@@ -21894,7 +21668,7 @@
                 <a:latin typeface="DejaVu Sans"/>
                 <a:ea typeface="DejaVu Sans"/>
               </a:rPr>
-              <a:t>Traceability Matrix</a:t>
+              <a:t>Traceability Graph</a:t>
             </a:r>
             <a:endParaRPr b="0" lang="en-US" sz="2200" spc="-1" strike="noStrike">
               <a:latin typeface="DejaVu Sans"/>
@@ -21911,7 +21685,7 @@
         <p:spPr>
           <a:xfrm>
             <a:off x="451800" y="1709280"/>
-            <a:ext cx="8224560" cy="4352760"/>
+            <a:ext cx="8224200" cy="4352400"/>
           </a:xfrm>
           <a:prstGeom prst="rect">
             <a:avLst/>
@@ -21941,7 +21715,7 @@
         <p:spPr>
           <a:xfrm>
             <a:off x="609480" y="1769400"/>
-            <a:ext cx="10587600" cy="4855680"/>
+            <a:ext cx="10587240" cy="4855320"/>
           </a:xfrm>
           <a:prstGeom prst="rect">
             <a:avLst/>
@@ -22112,7 +21886,7 @@
         <p:spPr>
           <a:xfrm>
             <a:off x="335520" y="4406760"/>
-            <a:ext cx="10748880" cy="1357920"/>
+            <a:ext cx="10748520" cy="1357560"/>
           </a:xfrm>
           <a:prstGeom prst="rect">
             <a:avLst/>
@@ -22164,7 +21938,7 @@
         <p:spPr>
           <a:xfrm>
             <a:off x="335520" y="2906640"/>
-            <a:ext cx="10748880" cy="1495800"/>
+            <a:ext cx="10748520" cy="1495440"/>
           </a:xfrm>
           <a:prstGeom prst="rect">
             <a:avLst/>
@@ -22220,7 +21994,7 @@
         <p:spPr>
           <a:xfrm>
             <a:off x="542880" y="721800"/>
-            <a:ext cx="10357200" cy="497880"/>
+            <a:ext cx="10356840" cy="497520"/>
           </a:xfrm>
           <a:prstGeom prst="rect">
             <a:avLst/>
@@ -22272,7 +22046,7 @@
         <p:spPr>
           <a:xfrm>
             <a:off x="451800" y="1709280"/>
-            <a:ext cx="8224560" cy="4352760"/>
+            <a:ext cx="8224200" cy="4352400"/>
           </a:xfrm>
           <a:prstGeom prst="rect">
             <a:avLst/>
@@ -22302,7 +22076,7 @@
         <p:spPr>
           <a:xfrm>
             <a:off x="609480" y="1769400"/>
-            <a:ext cx="10587600" cy="4855680"/>
+            <a:ext cx="10587240" cy="4855320"/>
           </a:xfrm>
           <a:prstGeom prst="rect">
             <a:avLst/>
@@ -22618,7 +22392,7 @@
         <p:spPr>
           <a:xfrm>
             <a:off x="335520" y="1268640"/>
-            <a:ext cx="10745640" cy="5033160"/>
+            <a:ext cx="10745280" cy="5032800"/>
           </a:xfrm>
           <a:prstGeom prst="rect">
             <a:avLst/>
@@ -22676,7 +22450,7 @@
         <p:spPr>
           <a:xfrm>
             <a:off x="335520" y="764640"/>
-            <a:ext cx="10745640" cy="496440"/>
+            <a:ext cx="10745280" cy="496080"/>
           </a:xfrm>
           <a:prstGeom prst="rect">
             <a:avLst/>
@@ -22736,7 +22510,7 @@
         <p:spPr>
           <a:xfrm>
             <a:off x="542880" y="685800"/>
-            <a:ext cx="10357200" cy="497880"/>
+            <a:ext cx="10356840" cy="497520"/>
           </a:xfrm>
           <a:prstGeom prst="rect">
             <a:avLst/>
@@ -22765,17 +22539,7 @@
                 <a:latin typeface="DejaVu Sans"/>
                 <a:ea typeface="DejaVu Sans"/>
               </a:rPr>
-              <a:t>Referen</a:t>
-            </a:r>
-            <a:r>
-              <a:rPr b="1" lang="de-DE" sz="2200" spc="-1" strike="noStrike">
-                <a:solidFill>
-                  <a:srgbClr val="000000"/>
-                </a:solidFill>
-                <a:latin typeface="DejaVu Sans"/>
-                <a:ea typeface="DejaVu Sans"/>
-              </a:rPr>
-              <a:t>ces</a:t>
+              <a:t>References</a:t>
             </a:r>
             <a:endParaRPr b="0" lang="en-US" sz="2200" spc="-1" strike="noStrike">
               <a:latin typeface="DejaVu Sans"/>
@@ -22822,7 +22586,7 @@
         <p:spPr>
           <a:xfrm>
             <a:off x="335520" y="4406760"/>
-            <a:ext cx="10748880" cy="1357920"/>
+            <a:ext cx="10748520" cy="1357560"/>
           </a:xfrm>
           <a:prstGeom prst="rect">
             <a:avLst/>
@@ -22874,7 +22638,7 @@
         <p:spPr>
           <a:xfrm>
             <a:off x="335520" y="2906640"/>
-            <a:ext cx="10748880" cy="1495800"/>
+            <a:ext cx="10748520" cy="1495440"/>
           </a:xfrm>
           <a:prstGeom prst="rect">
             <a:avLst/>
@@ -22930,7 +22694,7 @@
         <p:spPr>
           <a:xfrm>
             <a:off x="542880" y="721800"/>
-            <a:ext cx="10357200" cy="497880"/>
+            <a:ext cx="10356840" cy="497520"/>
           </a:xfrm>
           <a:prstGeom prst="rect">
             <a:avLst/>
@@ -22982,7 +22746,7 @@
         <p:spPr>
           <a:xfrm>
             <a:off x="542880" y="1267200"/>
-            <a:ext cx="10357200" cy="497880"/>
+            <a:ext cx="10356840" cy="497520"/>
           </a:xfrm>
           <a:prstGeom prst="rect">
             <a:avLst/>
@@ -23034,7 +22798,7 @@
         <p:spPr>
           <a:xfrm>
             <a:off x="451800" y="1709280"/>
-            <a:ext cx="8224560" cy="4352760"/>
+            <a:ext cx="8224200" cy="4352400"/>
           </a:xfrm>
           <a:prstGeom prst="rect">
             <a:avLst/>
@@ -23064,7 +22828,7 @@
         <p:spPr>
           <a:xfrm>
             <a:off x="609480" y="1769400"/>
-            <a:ext cx="10587600" cy="4855680"/>
+            <a:ext cx="10587240" cy="4855320"/>
           </a:xfrm>
           <a:prstGeom prst="rect">
             <a:avLst/>
@@ -23146,7 +22910,7 @@
         <p:spPr>
           <a:xfrm>
             <a:off x="602640" y="3174480"/>
-            <a:ext cx="10580400" cy="1879560"/>
+            <a:ext cx="10580040" cy="1879200"/>
           </a:xfrm>
           <a:prstGeom prst="roundRect">
             <a:avLst>
@@ -23213,7 +22977,7 @@
         <p:spPr>
           <a:xfrm>
             <a:off x="542880" y="721800"/>
-            <a:ext cx="10357200" cy="497880"/>
+            <a:ext cx="10356840" cy="497520"/>
           </a:xfrm>
           <a:prstGeom prst="rect">
             <a:avLst/>
@@ -23265,7 +23029,7 @@
         <p:spPr>
           <a:xfrm>
             <a:off x="542880" y="1267200"/>
-            <a:ext cx="10357200" cy="497880"/>
+            <a:ext cx="10356840" cy="497520"/>
           </a:xfrm>
           <a:prstGeom prst="rect">
             <a:avLst/>
@@ -23317,7 +23081,7 @@
         <p:spPr>
           <a:xfrm>
             <a:off x="451800" y="1709280"/>
-            <a:ext cx="8224560" cy="4352760"/>
+            <a:ext cx="8224200" cy="4352400"/>
           </a:xfrm>
           <a:prstGeom prst="rect">
             <a:avLst/>
@@ -23347,7 +23111,7 @@
         <p:spPr>
           <a:xfrm>
             <a:off x="588240" y="1769400"/>
-            <a:ext cx="10608840" cy="4638600"/>
+            <a:ext cx="10608480" cy="4638240"/>
           </a:xfrm>
           <a:prstGeom prst="rect">
             <a:avLst/>
@@ -23409,7 +23173,7 @@
         <p:spPr>
           <a:xfrm>
             <a:off x="602640" y="3174480"/>
-            <a:ext cx="10580400" cy="1879560"/>
+            <a:ext cx="10580040" cy="1879200"/>
           </a:xfrm>
           <a:prstGeom prst="roundRect">
             <a:avLst>
@@ -23446,7 +23210,7 @@
         <p:spPr>
           <a:xfrm>
             <a:off x="263520" y="6411600"/>
-            <a:ext cx="10919520" cy="226800"/>
+            <a:ext cx="10919160" cy="226800"/>
           </a:xfrm>
           <a:prstGeom prst="rect">
             <a:avLst/>
@@ -23538,7 +23302,7 @@
         <p:spPr>
           <a:xfrm>
             <a:off x="542880" y="721800"/>
-            <a:ext cx="10357200" cy="497880"/>
+            <a:ext cx="10356840" cy="497520"/>
           </a:xfrm>
           <a:prstGeom prst="rect">
             <a:avLst/>
@@ -23590,7 +23354,7 @@
         <p:spPr>
           <a:xfrm>
             <a:off x="542880" y="1267200"/>
-            <a:ext cx="10357200" cy="497880"/>
+            <a:ext cx="10356840" cy="497520"/>
           </a:xfrm>
           <a:prstGeom prst="rect">
             <a:avLst/>
@@ -23642,7 +23406,7 @@
         <p:spPr>
           <a:xfrm>
             <a:off x="451800" y="1709280"/>
-            <a:ext cx="8224560" cy="4352760"/>
+            <a:ext cx="8224200" cy="4352400"/>
           </a:xfrm>
           <a:prstGeom prst="rect">
             <a:avLst/>
@@ -23672,7 +23436,7 @@
         <p:spPr>
           <a:xfrm>
             <a:off x="609480" y="1769400"/>
-            <a:ext cx="10587600" cy="4855680"/>
+            <a:ext cx="10587240" cy="4855320"/>
           </a:xfrm>
           <a:prstGeom prst="rect">
             <a:avLst/>
@@ -23959,7 +23723,7 @@
         <p:spPr>
           <a:xfrm>
             <a:off x="542880" y="721800"/>
-            <a:ext cx="10357200" cy="497880"/>
+            <a:ext cx="10356840" cy="497520"/>
           </a:xfrm>
           <a:prstGeom prst="rect">
             <a:avLst/>
@@ -24011,7 +23775,7 @@
         <p:spPr>
           <a:xfrm>
             <a:off x="542880" y="1267200"/>
-            <a:ext cx="10357200" cy="497880"/>
+            <a:ext cx="10356840" cy="497520"/>
           </a:xfrm>
           <a:prstGeom prst="rect">
             <a:avLst/>
@@ -24063,7 +23827,7 @@
         <p:spPr>
           <a:xfrm>
             <a:off x="451800" y="1709280"/>
-            <a:ext cx="8224560" cy="4352760"/>
+            <a:ext cx="8224200" cy="4352400"/>
           </a:xfrm>
           <a:prstGeom prst="rect">
             <a:avLst/>
@@ -24093,7 +23857,7 @@
         <p:spPr>
           <a:xfrm>
             <a:off x="609480" y="1769400"/>
-            <a:ext cx="10587600" cy="4855680"/>
+            <a:ext cx="10587240" cy="4855320"/>
           </a:xfrm>
           <a:prstGeom prst="rect">
             <a:avLst/>
@@ -24380,7 +24144,7 @@
         <p:spPr>
           <a:xfrm>
             <a:off x="542880" y="721800"/>
-            <a:ext cx="10357200" cy="497880"/>
+            <a:ext cx="10356840" cy="497520"/>
           </a:xfrm>
           <a:prstGeom prst="rect">
             <a:avLst/>
@@ -24432,7 +24196,7 @@
         <p:spPr>
           <a:xfrm>
             <a:off x="542880" y="1267200"/>
-            <a:ext cx="10357200" cy="497880"/>
+            <a:ext cx="10356840" cy="497520"/>
           </a:xfrm>
           <a:prstGeom prst="rect">
             <a:avLst/>
@@ -24484,7 +24248,7 @@
         <p:spPr>
           <a:xfrm>
             <a:off x="451800" y="1709280"/>
-            <a:ext cx="8224560" cy="4352760"/>
+            <a:ext cx="8224200" cy="4352400"/>
           </a:xfrm>
           <a:prstGeom prst="rect">
             <a:avLst/>
@@ -24514,7 +24278,7 @@
         <p:spPr>
           <a:xfrm>
             <a:off x="609480" y="1769400"/>
-            <a:ext cx="10587600" cy="4855680"/>
+            <a:ext cx="10587240" cy="4855320"/>
           </a:xfrm>
           <a:prstGeom prst="rect">
             <a:avLst/>

</xml_diff>

<commit_message>
RE:L08:Slide 24 - Added a missing period.
</commit_message>
<xml_diff>
--- a/Requirements-Engineering/RE-L08_Traceability.pptx
+++ b/Requirements-Engineering/RE-L08_Traceability.pptx
@@ -345,7 +345,7 @@
             <a:pPr algn="r">
               <a:buNone/>
             </a:pPr>
-            <a:fld id="{790B5C11-0BD4-4E67-A98D-C99EE52F2337}" type="slidenum">
+            <a:fld id="{C77C9E74-C2CE-49F9-9156-1C12A65C663F}" type="slidenum">
               <a:rPr b="0" lang="en-US" sz="1400" spc="-1" strike="noStrike">
                 <a:latin typeface="DejaVu Serif"/>
               </a:rPr>
@@ -393,7 +393,7 @@
         <p:spPr>
           <a:xfrm>
             <a:off x="870120" y="1257480"/>
-            <a:ext cx="6028560" cy="3390120"/>
+            <a:ext cx="6028200" cy="3389760"/>
           </a:xfrm>
           <a:prstGeom prst="rect">
             <a:avLst/>
@@ -416,7 +416,7 @@
         <p:spPr>
           <a:xfrm>
             <a:off x="777960" y="4840200"/>
-            <a:ext cx="6212520" cy="3956760"/>
+            <a:ext cx="6212160" cy="3956400"/>
           </a:xfrm>
           <a:prstGeom prst="rect">
             <a:avLst/>
@@ -450,7 +450,7 @@
         <p:spPr>
           <a:xfrm>
             <a:off x="4402080" y="9553680"/>
-            <a:ext cx="3364560" cy="500760"/>
+            <a:ext cx="3364200" cy="500400"/>
           </a:xfrm>
           <a:prstGeom prst="rect">
             <a:avLst/>
@@ -482,7 +482,7 @@
               </a:lnSpc>
               <a:buNone/>
             </a:pPr>
-            <a:fld id="{15C9340F-6930-411F-9AF1-E629429094AD}" type="slidenum">
+            <a:fld id="{434E3F5F-2E50-432C-8BE3-56266885AE16}" type="slidenum">
               <a:rPr b="0" lang="de-DE" sz="1200" spc="-1" strike="noStrike">
                 <a:latin typeface="DejaVu Serif"/>
               </a:rPr>
@@ -529,7 +529,7 @@
         <p:spPr>
           <a:xfrm>
             <a:off x="870120" y="1257480"/>
-            <a:ext cx="6028560" cy="3390120"/>
+            <a:ext cx="6028200" cy="3389760"/>
           </a:xfrm>
           <a:prstGeom prst="rect">
             <a:avLst/>
@@ -552,7 +552,7 @@
         <p:spPr>
           <a:xfrm>
             <a:off x="777960" y="4840200"/>
-            <a:ext cx="6212520" cy="3956760"/>
+            <a:ext cx="6212160" cy="3956400"/>
           </a:xfrm>
           <a:prstGeom prst="rect">
             <a:avLst/>
@@ -586,7 +586,7 @@
         <p:spPr>
           <a:xfrm>
             <a:off x="4402080" y="9553680"/>
-            <a:ext cx="3364560" cy="500760"/>
+            <a:ext cx="3364200" cy="500400"/>
           </a:xfrm>
           <a:prstGeom prst="rect">
             <a:avLst/>
@@ -618,7 +618,7 @@
               </a:lnSpc>
               <a:buNone/>
             </a:pPr>
-            <a:fld id="{C04651F5-D9DE-4FDD-80D7-2081EE0A76E8}" type="slidenum">
+            <a:fld id="{FC094376-F0F9-4DF0-B2B9-FD89A8CCFF4F}" type="slidenum">
               <a:rPr b="0" lang="de-DE" sz="1200" spc="-1" strike="noStrike">
                 <a:latin typeface="DejaVu Serif"/>
               </a:rPr>
@@ -665,7 +665,7 @@
         <p:spPr>
           <a:xfrm>
             <a:off x="870120" y="1257480"/>
-            <a:ext cx="6028560" cy="3390120"/>
+            <a:ext cx="6028200" cy="3389760"/>
           </a:xfrm>
           <a:prstGeom prst="rect">
             <a:avLst/>
@@ -688,7 +688,7 @@
         <p:spPr>
           <a:xfrm>
             <a:off x="777960" y="4840200"/>
-            <a:ext cx="6212520" cy="3956760"/>
+            <a:ext cx="6212160" cy="3956400"/>
           </a:xfrm>
           <a:prstGeom prst="rect">
             <a:avLst/>
@@ -722,7 +722,7 @@
         <p:spPr>
           <a:xfrm>
             <a:off x="4402080" y="9553680"/>
-            <a:ext cx="3364560" cy="500760"/>
+            <a:ext cx="3364200" cy="500400"/>
           </a:xfrm>
           <a:prstGeom prst="rect">
             <a:avLst/>
@@ -754,7 +754,7 @@
               </a:lnSpc>
               <a:buNone/>
             </a:pPr>
-            <a:fld id="{2994AF71-4376-4B7E-AFDB-7FC1C074C828}" type="slidenum">
+            <a:fld id="{50D2C351-946A-4408-8037-B9F076248A10}" type="slidenum">
               <a:rPr b="0" lang="de-DE" sz="1200" spc="-1" strike="noStrike">
                 <a:latin typeface="DejaVu Serif"/>
               </a:rPr>
@@ -801,7 +801,7 @@
         <p:spPr>
           <a:xfrm>
             <a:off x="870120" y="1257480"/>
-            <a:ext cx="6028560" cy="3390120"/>
+            <a:ext cx="6028200" cy="3389760"/>
           </a:xfrm>
           <a:prstGeom prst="rect">
             <a:avLst/>
@@ -824,7 +824,7 @@
         <p:spPr>
           <a:xfrm>
             <a:off x="777960" y="4840200"/>
-            <a:ext cx="6212520" cy="3956760"/>
+            <a:ext cx="6212160" cy="3956400"/>
           </a:xfrm>
           <a:prstGeom prst="rect">
             <a:avLst/>
@@ -858,7 +858,7 @@
         <p:spPr>
           <a:xfrm>
             <a:off x="4402080" y="9553680"/>
-            <a:ext cx="3364560" cy="500760"/>
+            <a:ext cx="3364200" cy="500400"/>
           </a:xfrm>
           <a:prstGeom prst="rect">
             <a:avLst/>
@@ -890,7 +890,7 @@
               </a:lnSpc>
               <a:buNone/>
             </a:pPr>
-            <a:fld id="{B229691B-5A8E-49A1-A313-B8A2ABA9E047}" type="slidenum">
+            <a:fld id="{5F2D847E-9A4E-4425-B1C2-AFB71F306DAE}" type="slidenum">
               <a:rPr b="0" lang="de-DE" sz="1200" spc="-1" strike="noStrike">
                 <a:latin typeface="DejaVu Serif"/>
               </a:rPr>
@@ -7036,7 +7036,7 @@
         <p:spPr>
           <a:xfrm>
             <a:off x="11444760" y="0"/>
-            <a:ext cx="741240" cy="6850080"/>
+            <a:ext cx="740880" cy="6849720"/>
           </a:xfrm>
           <a:prstGeom prst="rect">
             <a:avLst/>
@@ -7066,7 +7066,7 @@
         <p:spPr>
           <a:xfrm>
             <a:off x="11438640" y="6453360"/>
-            <a:ext cx="758160" cy="363960"/>
+            <a:ext cx="757800" cy="363960"/>
           </a:xfrm>
           <a:prstGeom prst="rect">
             <a:avLst/>
@@ -7093,7 +7093,7 @@
               </a:lnSpc>
               <a:buNone/>
             </a:pPr>
-            <a:fld id="{B7C7D11A-CF28-4140-AD12-0352DF5A40D6}" type="slidenum">
+            <a:fld id="{D160B6F2-E8E3-4E5B-921B-F3BC1FF32677}" type="slidenum">
               <a:rPr b="0" lang="en-US" sz="1800" spc="-1" strike="noStrike">
                 <a:solidFill>
                   <a:srgbClr val="808080"/>
@@ -7118,7 +7118,7 @@
         <p:spPr>
           <a:xfrm>
             <a:off x="912240" y="1268280"/>
-            <a:ext cx="9208080" cy="361440"/>
+            <a:ext cx="9207720" cy="361080"/>
           </a:xfrm>
           <a:prstGeom prst="rect">
             <a:avLst/>
@@ -7148,7 +7148,7 @@
         <p:spPr>
           <a:xfrm>
             <a:off x="0" y="0"/>
-            <a:ext cx="3052080" cy="561960"/>
+            <a:ext cx="3051720" cy="561600"/>
           </a:xfrm>
           <a:prstGeom prst="rect">
             <a:avLst/>
@@ -7171,7 +7171,7 @@
         <p:spPr>
           <a:xfrm>
             <a:off x="7430400" y="134640"/>
-            <a:ext cx="3697920" cy="514080"/>
+            <a:ext cx="3697560" cy="513720"/>
           </a:xfrm>
           <a:prstGeom prst="rect">
             <a:avLst/>
@@ -7190,7 +7190,7 @@
         <p:spPr>
           <a:xfrm>
             <a:off x="912240" y="1268280"/>
-            <a:ext cx="9208080" cy="361440"/>
+            <a:ext cx="9207720" cy="361080"/>
           </a:xfrm>
           <a:prstGeom prst="rect">
             <a:avLst/>
@@ -7216,7 +7216,7 @@
         <p:spPr>
           <a:xfrm>
             <a:off x="11444760" y="0"/>
-            <a:ext cx="741240" cy="6850080"/>
+            <a:ext cx="740880" cy="6849720"/>
           </a:xfrm>
           <a:prstGeom prst="rect">
             <a:avLst/>
@@ -7246,7 +7246,7 @@
         <p:spPr>
           <a:xfrm>
             <a:off x="0" y="6646680"/>
-            <a:ext cx="12187440" cy="211320"/>
+            <a:ext cx="12187080" cy="211320"/>
           </a:xfrm>
           <a:prstGeom prst="rect">
             <a:avLst/>
@@ -7568,7 +7568,7 @@
         <p:spPr>
           <a:xfrm>
             <a:off x="11444760" y="0"/>
-            <a:ext cx="741240" cy="6850080"/>
+            <a:ext cx="740880" cy="6849720"/>
           </a:xfrm>
           <a:prstGeom prst="rect">
             <a:avLst/>
@@ -7598,7 +7598,7 @@
         <p:spPr>
           <a:xfrm>
             <a:off x="11438640" y="6453360"/>
-            <a:ext cx="758160" cy="363960"/>
+            <a:ext cx="757800" cy="363960"/>
           </a:xfrm>
           <a:prstGeom prst="rect">
             <a:avLst/>
@@ -7625,7 +7625,7 @@
               </a:lnSpc>
               <a:buNone/>
             </a:pPr>
-            <a:fld id="{08CE2843-75A0-4CC4-955F-40C7626FD524}" type="slidenum">
+            <a:fld id="{51A66FB4-4B5C-42D3-A6F5-E5A84D0061DD}" type="slidenum">
               <a:rPr b="0" lang="en-US" sz="1800" spc="-1" strike="noStrike">
                 <a:solidFill>
                   <a:srgbClr val="808080"/>
@@ -7650,7 +7650,7 @@
         <p:spPr>
           <a:xfrm>
             <a:off x="912240" y="1268280"/>
-            <a:ext cx="9208080" cy="361440"/>
+            <a:ext cx="9207720" cy="361080"/>
           </a:xfrm>
           <a:prstGeom prst="rect">
             <a:avLst/>
@@ -7680,7 +7680,7 @@
         <p:spPr>
           <a:xfrm>
             <a:off x="0" y="0"/>
-            <a:ext cx="3052080" cy="561960"/>
+            <a:ext cx="3051720" cy="561600"/>
           </a:xfrm>
           <a:prstGeom prst="rect">
             <a:avLst/>
@@ -7703,7 +7703,7 @@
         <p:spPr>
           <a:xfrm>
             <a:off x="7430400" y="134640"/>
-            <a:ext cx="3697920" cy="514080"/>
+            <a:ext cx="3697560" cy="513720"/>
           </a:xfrm>
           <a:prstGeom prst="rect">
             <a:avLst/>
@@ -7722,7 +7722,7 @@
         <p:spPr>
           <a:xfrm>
             <a:off x="912240" y="1268280"/>
-            <a:ext cx="9208080" cy="361440"/>
+            <a:ext cx="9207720" cy="361080"/>
           </a:xfrm>
           <a:prstGeom prst="rect">
             <a:avLst/>
@@ -7748,7 +7748,7 @@
         <p:spPr>
           <a:xfrm>
             <a:off x="11444760" y="0"/>
-            <a:ext cx="741240" cy="6850080"/>
+            <a:ext cx="740880" cy="6849720"/>
           </a:xfrm>
           <a:prstGeom prst="rect">
             <a:avLst/>
@@ -7778,7 +7778,7 @@
         <p:spPr>
           <a:xfrm>
             <a:off x="0" y="6646680"/>
-            <a:ext cx="12187440" cy="211320"/>
+            <a:ext cx="12187080" cy="211320"/>
           </a:xfrm>
           <a:prstGeom prst="rect">
             <a:avLst/>
@@ -8100,7 +8100,7 @@
         <p:spPr>
           <a:xfrm>
             <a:off x="11444760" y="0"/>
-            <a:ext cx="741240" cy="6850080"/>
+            <a:ext cx="740880" cy="6849720"/>
           </a:xfrm>
           <a:prstGeom prst="rect">
             <a:avLst/>
@@ -8130,7 +8130,7 @@
         <p:spPr>
           <a:xfrm>
             <a:off x="11438640" y="6453360"/>
-            <a:ext cx="758160" cy="363960"/>
+            <a:ext cx="757800" cy="363960"/>
           </a:xfrm>
           <a:prstGeom prst="rect">
             <a:avLst/>
@@ -8157,7 +8157,7 @@
               </a:lnSpc>
               <a:buNone/>
             </a:pPr>
-            <a:fld id="{06EFFE09-153D-41AA-9185-5E7EFB54DE29}" type="slidenum">
+            <a:fld id="{9377191F-3BFA-456E-A84C-4049B8307190}" type="slidenum">
               <a:rPr b="0" lang="en-US" sz="1800" spc="-1" strike="noStrike">
                 <a:solidFill>
                   <a:srgbClr val="808080"/>
@@ -8182,7 +8182,7 @@
         <p:spPr>
           <a:xfrm>
             <a:off x="912240" y="1268280"/>
-            <a:ext cx="9208080" cy="361440"/>
+            <a:ext cx="9207720" cy="361080"/>
           </a:xfrm>
           <a:prstGeom prst="rect">
             <a:avLst/>
@@ -8212,7 +8212,7 @@
         <p:spPr>
           <a:xfrm>
             <a:off x="0" y="0"/>
-            <a:ext cx="3052080" cy="561960"/>
+            <a:ext cx="3051720" cy="561600"/>
           </a:xfrm>
           <a:prstGeom prst="rect">
             <a:avLst/>
@@ -8235,7 +8235,7 @@
         <p:spPr>
           <a:xfrm>
             <a:off x="7430400" y="134640"/>
-            <a:ext cx="3697920" cy="514080"/>
+            <a:ext cx="3697560" cy="513720"/>
           </a:xfrm>
           <a:prstGeom prst="rect">
             <a:avLst/>
@@ -8254,7 +8254,7 @@
         <p:spPr>
           <a:xfrm>
             <a:off x="11444760" y="1440"/>
-            <a:ext cx="741240" cy="6850080"/>
+            <a:ext cx="740880" cy="6849720"/>
           </a:xfrm>
           <a:prstGeom prst="rect">
             <a:avLst/>
@@ -8284,7 +8284,7 @@
         <p:spPr>
           <a:xfrm>
             <a:off x="11427480" y="6453360"/>
-            <a:ext cx="758160" cy="363960"/>
+            <a:ext cx="757800" cy="363960"/>
           </a:xfrm>
           <a:prstGeom prst="rect">
             <a:avLst/>
@@ -8311,7 +8311,7 @@
               </a:lnSpc>
               <a:buNone/>
             </a:pPr>
-            <a:fld id="{B871C37C-E2E8-46FF-9A50-2E9DA460C4C2}" type="slidenum">
+            <a:fld id="{A7C0E4AF-D289-4804-B049-59AC1038AE8F}" type="slidenum">
               <a:rPr b="0" lang="en-US" sz="1800" spc="-1" strike="noStrike">
                 <a:solidFill>
                   <a:srgbClr val="808080"/>
@@ -8336,7 +8336,7 @@
         <p:spPr>
           <a:xfrm>
             <a:off x="0" y="6646680"/>
-            <a:ext cx="12187440" cy="211320"/>
+            <a:ext cx="12187080" cy="211320"/>
           </a:xfrm>
           <a:prstGeom prst="rect">
             <a:avLst/>
@@ -8658,7 +8658,7 @@
         <p:spPr>
           <a:xfrm>
             <a:off x="11444760" y="0"/>
-            <a:ext cx="741240" cy="6850080"/>
+            <a:ext cx="740880" cy="6849720"/>
           </a:xfrm>
           <a:prstGeom prst="rect">
             <a:avLst/>
@@ -8688,7 +8688,7 @@
         <p:spPr>
           <a:xfrm>
             <a:off x="11438640" y="6453360"/>
-            <a:ext cx="758160" cy="363960"/>
+            <a:ext cx="757800" cy="363960"/>
           </a:xfrm>
           <a:prstGeom prst="rect">
             <a:avLst/>
@@ -8715,7 +8715,7 @@
               </a:lnSpc>
               <a:buNone/>
             </a:pPr>
-            <a:fld id="{03877EE1-BA3A-469B-B1A2-9C3FA79A9D02}" type="slidenum">
+            <a:fld id="{B1E0EC8F-DFF9-4B15-9878-75F214B11A1A}" type="slidenum">
               <a:rPr b="0" lang="en-US" sz="1800" spc="-1" strike="noStrike">
                 <a:solidFill>
                   <a:srgbClr val="808080"/>
@@ -8740,7 +8740,7 @@
         <p:spPr>
           <a:xfrm>
             <a:off x="912240" y="1268280"/>
-            <a:ext cx="9208080" cy="361440"/>
+            <a:ext cx="9207720" cy="361080"/>
           </a:xfrm>
           <a:prstGeom prst="rect">
             <a:avLst/>
@@ -8770,7 +8770,7 @@
         <p:spPr>
           <a:xfrm>
             <a:off x="0" y="0"/>
-            <a:ext cx="3052080" cy="561960"/>
+            <a:ext cx="3051720" cy="561600"/>
           </a:xfrm>
           <a:prstGeom prst="rect">
             <a:avLst/>
@@ -8793,7 +8793,7 @@
         <p:spPr>
           <a:xfrm>
             <a:off x="7430400" y="134640"/>
-            <a:ext cx="3697920" cy="514080"/>
+            <a:ext cx="3697560" cy="513720"/>
           </a:xfrm>
           <a:prstGeom prst="rect">
             <a:avLst/>
@@ -8812,7 +8812,7 @@
         <p:spPr>
           <a:xfrm>
             <a:off x="11444760" y="1440"/>
-            <a:ext cx="741240" cy="6850080"/>
+            <a:ext cx="740880" cy="6849720"/>
           </a:xfrm>
           <a:prstGeom prst="rect">
             <a:avLst/>
@@ -8842,7 +8842,7 @@
         <p:spPr>
           <a:xfrm>
             <a:off x="11427480" y="6453360"/>
-            <a:ext cx="758160" cy="363960"/>
+            <a:ext cx="757800" cy="363960"/>
           </a:xfrm>
           <a:prstGeom prst="rect">
             <a:avLst/>
@@ -8869,7 +8869,7 @@
               </a:lnSpc>
               <a:buNone/>
             </a:pPr>
-            <a:fld id="{89B63794-CE62-47DA-BFCB-B05687957345}" type="slidenum">
+            <a:fld id="{CC5D6451-D1D9-484E-8B5D-8489B7CBA3C0}" type="slidenum">
               <a:rPr b="0" lang="en-US" sz="1800" spc="-1" strike="noStrike">
                 <a:solidFill>
                   <a:srgbClr val="808080"/>
@@ -8894,7 +8894,7 @@
         <p:spPr>
           <a:xfrm>
             <a:off x="0" y="6646680"/>
-            <a:ext cx="12187440" cy="211320"/>
+            <a:ext cx="12187080" cy="211320"/>
           </a:xfrm>
           <a:prstGeom prst="rect">
             <a:avLst/>
@@ -9209,7 +9209,7 @@
         <p:spPr>
           <a:xfrm>
             <a:off x="527400" y="1412640"/>
-            <a:ext cx="10364040" cy="1150560"/>
+            <a:ext cx="10363680" cy="1150200"/>
           </a:xfrm>
           <a:prstGeom prst="rect">
             <a:avLst/>
@@ -9261,7 +9261,7 @@
         <p:spPr>
           <a:xfrm>
             <a:off x="527400" y="2852640"/>
-            <a:ext cx="10364040" cy="2371320"/>
+            <a:ext cx="10363680" cy="2370960"/>
           </a:xfrm>
           <a:prstGeom prst="rect">
             <a:avLst/>
@@ -9464,7 +9464,7 @@
         <p:spPr>
           <a:xfrm>
             <a:off x="542880" y="721800"/>
-            <a:ext cx="10356840" cy="497520"/>
+            <a:ext cx="10356480" cy="497160"/>
           </a:xfrm>
           <a:prstGeom prst="rect">
             <a:avLst/>
@@ -9516,7 +9516,7 @@
         <p:spPr>
           <a:xfrm>
             <a:off x="542880" y="1267200"/>
-            <a:ext cx="10356840" cy="497520"/>
+            <a:ext cx="10356480" cy="497160"/>
           </a:xfrm>
           <a:prstGeom prst="rect">
             <a:avLst/>
@@ -9568,7 +9568,7 @@
         <p:spPr>
           <a:xfrm>
             <a:off x="451800" y="1709280"/>
-            <a:ext cx="8224200" cy="4352400"/>
+            <a:ext cx="8223840" cy="4352040"/>
           </a:xfrm>
           <a:prstGeom prst="rect">
             <a:avLst/>
@@ -9594,7 +9594,7 @@
         <p:spPr>
           <a:xfrm>
             <a:off x="263520" y="6411600"/>
-            <a:ext cx="10919160" cy="226800"/>
+            <a:ext cx="10918800" cy="226800"/>
           </a:xfrm>
           <a:prstGeom prst="rect">
             <a:avLst/>
@@ -9680,7 +9680,7 @@
         <p:spPr>
           <a:xfrm>
             <a:off x="2892600" y="1768680"/>
-            <a:ext cx="5657760" cy="4462200"/>
+            <a:ext cx="5657400" cy="4461840"/>
           </a:xfrm>
           <a:prstGeom prst="rect">
             <a:avLst/>
@@ -9729,7 +9729,7 @@
         <p:spPr>
           <a:xfrm>
             <a:off x="335520" y="4406760"/>
-            <a:ext cx="10748520" cy="1357560"/>
+            <a:ext cx="10748160" cy="1357200"/>
           </a:xfrm>
           <a:prstGeom prst="rect">
             <a:avLst/>
@@ -9781,7 +9781,7 @@
         <p:spPr>
           <a:xfrm>
             <a:off x="335520" y="2906640"/>
-            <a:ext cx="10748520" cy="1495440"/>
+            <a:ext cx="10748160" cy="1495080"/>
           </a:xfrm>
           <a:prstGeom prst="rect">
             <a:avLst/>
@@ -9837,7 +9837,7 @@
         <p:spPr>
           <a:xfrm>
             <a:off x="542880" y="721800"/>
-            <a:ext cx="10356840" cy="497520"/>
+            <a:ext cx="10356480" cy="497160"/>
           </a:xfrm>
           <a:prstGeom prst="rect">
             <a:avLst/>
@@ -9889,7 +9889,7 @@
         <p:spPr>
           <a:xfrm>
             <a:off x="542880" y="1267200"/>
-            <a:ext cx="10356840" cy="497520"/>
+            <a:ext cx="10356480" cy="497160"/>
           </a:xfrm>
           <a:prstGeom prst="rect">
             <a:avLst/>
@@ -9941,7 +9941,7 @@
         <p:spPr>
           <a:xfrm>
             <a:off x="451800" y="1709280"/>
-            <a:ext cx="8224200" cy="4352400"/>
+            <a:ext cx="8223840" cy="4352040"/>
           </a:xfrm>
           <a:prstGeom prst="rect">
             <a:avLst/>
@@ -9971,7 +9971,7 @@
         <p:spPr>
           <a:xfrm>
             <a:off x="684720" y="3077280"/>
-            <a:ext cx="10073160" cy="1195200"/>
+            <a:ext cx="10072800" cy="1194840"/>
           </a:xfrm>
           <a:prstGeom prst="rect">
             <a:avLst/>
@@ -9990,7 +9990,7 @@
         <p:spPr>
           <a:xfrm>
             <a:off x="263520" y="6411600"/>
-            <a:ext cx="10919160" cy="226800"/>
+            <a:ext cx="10918800" cy="226800"/>
           </a:xfrm>
           <a:prstGeom prst="rect">
             <a:avLst/>
@@ -10082,7 +10082,7 @@
         <p:spPr>
           <a:xfrm>
             <a:off x="542880" y="721800"/>
-            <a:ext cx="10356840" cy="497520"/>
+            <a:ext cx="10356480" cy="497160"/>
           </a:xfrm>
           <a:prstGeom prst="rect">
             <a:avLst/>
@@ -10134,7 +10134,7 @@
         <p:spPr>
           <a:xfrm>
             <a:off x="542880" y="1267200"/>
-            <a:ext cx="10356840" cy="497520"/>
+            <a:ext cx="10356480" cy="497160"/>
           </a:xfrm>
           <a:prstGeom prst="rect">
             <a:avLst/>
@@ -10186,7 +10186,7 @@
         <p:spPr>
           <a:xfrm>
             <a:off x="451800" y="1709280"/>
-            <a:ext cx="8224200" cy="4352400"/>
+            <a:ext cx="8223840" cy="4352040"/>
           </a:xfrm>
           <a:prstGeom prst="rect">
             <a:avLst/>
@@ -10216,7 +10216,7 @@
         <p:spPr>
           <a:xfrm>
             <a:off x="609480" y="1769400"/>
-            <a:ext cx="10587240" cy="4855320"/>
+            <a:ext cx="10586880" cy="4854960"/>
           </a:xfrm>
           <a:prstGeom prst="rect">
             <a:avLst/>
@@ -10460,7 +10460,7 @@
         <p:spPr>
           <a:xfrm>
             <a:off x="542880" y="721800"/>
-            <a:ext cx="10356840" cy="497520"/>
+            <a:ext cx="10356480" cy="497160"/>
           </a:xfrm>
           <a:prstGeom prst="rect">
             <a:avLst/>
@@ -10512,7 +10512,7 @@
         <p:spPr>
           <a:xfrm>
             <a:off x="542880" y="1267200"/>
-            <a:ext cx="10356840" cy="497520"/>
+            <a:ext cx="10356480" cy="497160"/>
           </a:xfrm>
           <a:prstGeom prst="rect">
             <a:avLst/>
@@ -10564,7 +10564,7 @@
         <p:spPr>
           <a:xfrm>
             <a:off x="451800" y="1709280"/>
-            <a:ext cx="8224200" cy="4352400"/>
+            <a:ext cx="8223840" cy="4352040"/>
           </a:xfrm>
           <a:prstGeom prst="rect">
             <a:avLst/>
@@ -10594,7 +10594,7 @@
         <p:spPr>
           <a:xfrm>
             <a:off x="609480" y="1769400"/>
-            <a:ext cx="10587240" cy="4855320"/>
+            <a:ext cx="10586880" cy="4854960"/>
           </a:xfrm>
           <a:prstGeom prst="rect">
             <a:avLst/>
@@ -10759,7 +10759,7 @@
         <p:spPr>
           <a:xfrm>
             <a:off x="263520" y="6411600"/>
-            <a:ext cx="10919160" cy="226800"/>
+            <a:ext cx="10918800" cy="226800"/>
           </a:xfrm>
           <a:prstGeom prst="rect">
             <a:avLst/>
@@ -10851,7 +10851,7 @@
         <p:spPr>
           <a:xfrm>
             <a:off x="542880" y="721800"/>
-            <a:ext cx="10356840" cy="497520"/>
+            <a:ext cx="10356480" cy="497160"/>
           </a:xfrm>
           <a:prstGeom prst="rect">
             <a:avLst/>
@@ -10903,7 +10903,7 @@
         <p:spPr>
           <a:xfrm>
             <a:off x="542880" y="1267200"/>
-            <a:ext cx="10356840" cy="497520"/>
+            <a:ext cx="10356480" cy="497160"/>
           </a:xfrm>
           <a:prstGeom prst="rect">
             <a:avLst/>
@@ -10955,7 +10955,7 @@
         <p:spPr>
           <a:xfrm>
             <a:off x="451800" y="1709280"/>
-            <a:ext cx="8224200" cy="4352400"/>
+            <a:ext cx="8223840" cy="4352040"/>
           </a:xfrm>
           <a:prstGeom prst="rect">
             <a:avLst/>
@@ -10985,7 +10985,7 @@
         <p:spPr>
           <a:xfrm>
             <a:off x="609480" y="1769400"/>
-            <a:ext cx="10587240" cy="4855320"/>
+            <a:ext cx="10586880" cy="4854960"/>
           </a:xfrm>
           <a:prstGeom prst="rect">
             <a:avLst/>
@@ -11218,7 +11218,7 @@
         <p:spPr>
           <a:xfrm>
             <a:off x="263520" y="6411600"/>
-            <a:ext cx="10919160" cy="226800"/>
+            <a:ext cx="10918800" cy="226800"/>
           </a:xfrm>
           <a:prstGeom prst="rect">
             <a:avLst/>
@@ -11310,7 +11310,7 @@
         <p:spPr>
           <a:xfrm>
             <a:off x="542880" y="721800"/>
-            <a:ext cx="10356840" cy="497520"/>
+            <a:ext cx="10356480" cy="497160"/>
           </a:xfrm>
           <a:prstGeom prst="rect">
             <a:avLst/>
@@ -11362,7 +11362,7 @@
         <p:spPr>
           <a:xfrm>
             <a:off x="542880" y="1267200"/>
-            <a:ext cx="10356840" cy="497520"/>
+            <a:ext cx="10356480" cy="497160"/>
           </a:xfrm>
           <a:prstGeom prst="rect">
             <a:avLst/>
@@ -11414,7 +11414,7 @@
         <p:spPr>
           <a:xfrm>
             <a:off x="451800" y="1709280"/>
-            <a:ext cx="8224200" cy="4352400"/>
+            <a:ext cx="8223840" cy="4352040"/>
           </a:xfrm>
           <a:prstGeom prst="rect">
             <a:avLst/>
@@ -11444,7 +11444,7 @@
         <p:spPr>
           <a:xfrm>
             <a:off x="609480" y="1769400"/>
-            <a:ext cx="10587240" cy="4855320"/>
+            <a:ext cx="10586880" cy="4854960"/>
           </a:xfrm>
           <a:prstGeom prst="rect">
             <a:avLst/>
@@ -11855,7 +11855,7 @@
         <p:spPr>
           <a:xfrm>
             <a:off x="263520" y="6411600"/>
-            <a:ext cx="10919160" cy="226800"/>
+            <a:ext cx="10918800" cy="226800"/>
           </a:xfrm>
           <a:prstGeom prst="rect">
             <a:avLst/>
@@ -11947,7 +11947,7 @@
         <p:spPr>
           <a:xfrm>
             <a:off x="542880" y="721800"/>
-            <a:ext cx="10356840" cy="497520"/>
+            <a:ext cx="10356480" cy="497160"/>
           </a:xfrm>
           <a:prstGeom prst="rect">
             <a:avLst/>
@@ -11999,7 +11999,7 @@
         <p:spPr>
           <a:xfrm>
             <a:off x="542880" y="1267200"/>
-            <a:ext cx="10356840" cy="497520"/>
+            <a:ext cx="10356480" cy="497160"/>
           </a:xfrm>
           <a:prstGeom prst="rect">
             <a:avLst/>
@@ -12051,7 +12051,7 @@
         <p:spPr>
           <a:xfrm>
             <a:off x="451800" y="1709280"/>
-            <a:ext cx="8224200" cy="4352400"/>
+            <a:ext cx="8223840" cy="4352040"/>
           </a:xfrm>
           <a:prstGeom prst="rect">
             <a:avLst/>
@@ -12081,7 +12081,7 @@
         <p:spPr>
           <a:xfrm>
             <a:off x="609480" y="1769400"/>
-            <a:ext cx="10587240" cy="4855320"/>
+            <a:ext cx="10586880" cy="4854960"/>
           </a:xfrm>
           <a:prstGeom prst="rect">
             <a:avLst/>
@@ -12513,7 +12513,7 @@
         <p:spPr>
           <a:xfrm>
             <a:off x="263520" y="6411600"/>
-            <a:ext cx="10919160" cy="226800"/>
+            <a:ext cx="10918800" cy="226800"/>
           </a:xfrm>
           <a:prstGeom prst="rect">
             <a:avLst/>
@@ -12605,7 +12605,7 @@
         <p:spPr>
           <a:xfrm>
             <a:off x="542880" y="721800"/>
-            <a:ext cx="10356840" cy="497520"/>
+            <a:ext cx="10356480" cy="497160"/>
           </a:xfrm>
           <a:prstGeom prst="rect">
             <a:avLst/>
@@ -12657,7 +12657,7 @@
         <p:spPr>
           <a:xfrm>
             <a:off x="542880" y="1267200"/>
-            <a:ext cx="10356840" cy="497520"/>
+            <a:ext cx="10356480" cy="497160"/>
           </a:xfrm>
           <a:prstGeom prst="rect">
             <a:avLst/>
@@ -12709,7 +12709,7 @@
         <p:spPr>
           <a:xfrm>
             <a:off x="451800" y="1709280"/>
-            <a:ext cx="8224200" cy="4352400"/>
+            <a:ext cx="8223840" cy="4352040"/>
           </a:xfrm>
           <a:prstGeom prst="rect">
             <a:avLst/>
@@ -12739,7 +12739,7 @@
         <p:spPr>
           <a:xfrm>
             <a:off x="609480" y="1769400"/>
-            <a:ext cx="10587240" cy="4855320"/>
+            <a:ext cx="10586880" cy="4854960"/>
           </a:xfrm>
           <a:prstGeom prst="rect">
             <a:avLst/>
@@ -13287,7 +13287,7 @@
         <p:spPr>
           <a:xfrm>
             <a:off x="268920" y="6496920"/>
-            <a:ext cx="10919160" cy="226800"/>
+            <a:ext cx="10918800" cy="226800"/>
           </a:xfrm>
           <a:prstGeom prst="rect">
             <a:avLst/>
@@ -13379,7 +13379,7 @@
         <p:spPr>
           <a:xfrm>
             <a:off x="542880" y="721800"/>
-            <a:ext cx="10356840" cy="497520"/>
+            <a:ext cx="10356480" cy="497160"/>
           </a:xfrm>
           <a:prstGeom prst="rect">
             <a:avLst/>
@@ -13431,7 +13431,7 @@
         <p:spPr>
           <a:xfrm>
             <a:off x="542880" y="1267200"/>
-            <a:ext cx="10356840" cy="497520"/>
+            <a:ext cx="10356480" cy="497160"/>
           </a:xfrm>
           <a:prstGeom prst="rect">
             <a:avLst/>
@@ -13483,7 +13483,7 @@
         <p:spPr>
           <a:xfrm>
             <a:off x="451800" y="1709280"/>
-            <a:ext cx="8224200" cy="4352400"/>
+            <a:ext cx="8223840" cy="4352040"/>
           </a:xfrm>
           <a:prstGeom prst="rect">
             <a:avLst/>
@@ -13513,7 +13513,7 @@
         <p:spPr>
           <a:xfrm>
             <a:off x="609480" y="1769400"/>
-            <a:ext cx="10587240" cy="4855320"/>
+            <a:ext cx="10586880" cy="4854960"/>
           </a:xfrm>
           <a:prstGeom prst="rect">
             <a:avLst/>
@@ -13855,7 +13855,7 @@
         <p:spPr>
           <a:xfrm>
             <a:off x="263520" y="6411600"/>
-            <a:ext cx="10919160" cy="226800"/>
+            <a:ext cx="10918800" cy="226800"/>
           </a:xfrm>
           <a:prstGeom prst="rect">
             <a:avLst/>
@@ -13947,7 +13947,7 @@
         <p:spPr>
           <a:xfrm>
             <a:off x="542880" y="721800"/>
-            <a:ext cx="10356840" cy="497520"/>
+            <a:ext cx="10356480" cy="497160"/>
           </a:xfrm>
           <a:prstGeom prst="rect">
             <a:avLst/>
@@ -13999,7 +13999,7 @@
         <p:spPr>
           <a:xfrm>
             <a:off x="542880" y="1267200"/>
-            <a:ext cx="10356840" cy="497520"/>
+            <a:ext cx="10356480" cy="497160"/>
           </a:xfrm>
           <a:prstGeom prst="rect">
             <a:avLst/>
@@ -14055,7 +14055,7 @@
         <p:spPr>
           <a:xfrm>
             <a:off x="542880" y="2387520"/>
-            <a:ext cx="10101960" cy="2079360"/>
+            <a:ext cx="10101600" cy="2079000"/>
           </a:xfrm>
           <a:prstGeom prst="rect">
             <a:avLst/>
@@ -14074,7 +14074,7 @@
         <p:spPr>
           <a:xfrm>
             <a:off x="8879760" y="2309760"/>
-            <a:ext cx="1838520" cy="2258280"/>
+            <a:ext cx="1838160" cy="2257920"/>
           </a:xfrm>
           <a:prstGeom prst="frame">
             <a:avLst>
@@ -14145,7 +14145,7 @@
         <p:spPr>
           <a:xfrm>
             <a:off x="542880" y="721800"/>
-            <a:ext cx="10356840" cy="497520"/>
+            <a:ext cx="10356480" cy="497160"/>
           </a:xfrm>
           <a:prstGeom prst="rect">
             <a:avLst/>
@@ -14197,7 +14197,7 @@
         <p:spPr>
           <a:xfrm>
             <a:off x="542880" y="1267200"/>
-            <a:ext cx="10356840" cy="497520"/>
+            <a:ext cx="10356480" cy="497160"/>
           </a:xfrm>
           <a:prstGeom prst="rect">
             <a:avLst/>
@@ -14249,7 +14249,7 @@
         <p:spPr>
           <a:xfrm>
             <a:off x="451800" y="1709280"/>
-            <a:ext cx="8224200" cy="4352400"/>
+            <a:ext cx="8223840" cy="4352040"/>
           </a:xfrm>
           <a:prstGeom prst="rect">
             <a:avLst/>
@@ -14279,7 +14279,7 @@
         <p:spPr>
           <a:xfrm>
             <a:off x="609480" y="1769400"/>
-            <a:ext cx="10587240" cy="4855320"/>
+            <a:ext cx="10586880" cy="4854960"/>
           </a:xfrm>
           <a:prstGeom prst="rect">
             <a:avLst/>
@@ -14561,7 +14561,7 @@
         <p:spPr>
           <a:xfrm>
             <a:off x="263520" y="6411600"/>
-            <a:ext cx="10919160" cy="226800"/>
+            <a:ext cx="10918800" cy="226800"/>
           </a:xfrm>
           <a:prstGeom prst="rect">
             <a:avLst/>
@@ -14653,7 +14653,7 @@
         <p:spPr>
           <a:xfrm>
             <a:off x="335520" y="4406760"/>
-            <a:ext cx="10748520" cy="1357560"/>
+            <a:ext cx="10748160" cy="1357200"/>
           </a:xfrm>
           <a:prstGeom prst="rect">
             <a:avLst/>
@@ -14705,7 +14705,7 @@
         <p:spPr>
           <a:xfrm>
             <a:off x="335520" y="2906640"/>
-            <a:ext cx="10748520" cy="1495440"/>
+            <a:ext cx="10748160" cy="1495080"/>
           </a:xfrm>
           <a:prstGeom prst="rect">
             <a:avLst/>
@@ -14761,7 +14761,7 @@
         <p:spPr>
           <a:xfrm>
             <a:off x="542880" y="721800"/>
-            <a:ext cx="10356840" cy="497520"/>
+            <a:ext cx="10356480" cy="497160"/>
           </a:xfrm>
           <a:prstGeom prst="rect">
             <a:avLst/>
@@ -14813,7 +14813,7 @@
         <p:spPr>
           <a:xfrm>
             <a:off x="542880" y="1267200"/>
-            <a:ext cx="10356840" cy="497520"/>
+            <a:ext cx="10356480" cy="497160"/>
           </a:xfrm>
           <a:prstGeom prst="rect">
             <a:avLst/>
@@ -14865,7 +14865,7 @@
         <p:spPr>
           <a:xfrm>
             <a:off x="451800" y="1709280"/>
-            <a:ext cx="8224200" cy="4352400"/>
+            <a:ext cx="8223840" cy="4352040"/>
           </a:xfrm>
           <a:prstGeom prst="rect">
             <a:avLst/>
@@ -14895,7 +14895,7 @@
         <p:spPr>
           <a:xfrm>
             <a:off x="609480" y="1769400"/>
-            <a:ext cx="10587240" cy="4855320"/>
+            <a:ext cx="10586880" cy="4854960"/>
           </a:xfrm>
           <a:prstGeom prst="rect">
             <a:avLst/>
@@ -15090,7 +15090,7 @@
         <p:spPr>
           <a:xfrm>
             <a:off x="542880" y="721800"/>
-            <a:ext cx="10356840" cy="497520"/>
+            <a:ext cx="10356480" cy="497160"/>
           </a:xfrm>
           <a:prstGeom prst="rect">
             <a:avLst/>
@@ -15142,7 +15142,7 @@
         <p:spPr>
           <a:xfrm>
             <a:off x="542880" y="1267200"/>
-            <a:ext cx="10356840" cy="497520"/>
+            <a:ext cx="10356480" cy="497160"/>
           </a:xfrm>
           <a:prstGeom prst="rect">
             <a:avLst/>
@@ -15194,7 +15194,7 @@
         <p:spPr>
           <a:xfrm>
             <a:off x="451800" y="1709280"/>
-            <a:ext cx="8224200" cy="4352400"/>
+            <a:ext cx="8223840" cy="4352040"/>
           </a:xfrm>
           <a:prstGeom prst="rect">
             <a:avLst/>
@@ -15224,7 +15224,7 @@
         <p:spPr>
           <a:xfrm>
             <a:off x="609480" y="1769400"/>
-            <a:ext cx="10587240" cy="4855320"/>
+            <a:ext cx="10586880" cy="4854960"/>
           </a:xfrm>
           <a:prstGeom prst="rect">
             <a:avLst/>
@@ -15287,7 +15287,7 @@
         <p:spPr>
           <a:xfrm>
             <a:off x="263520" y="6411600"/>
-            <a:ext cx="10919160" cy="226800"/>
+            <a:ext cx="10918800" cy="226800"/>
           </a:xfrm>
           <a:prstGeom prst="rect">
             <a:avLst/>
@@ -15349,7 +15349,7 @@
         <p:spPr>
           <a:xfrm>
             <a:off x="602640" y="3257640"/>
-            <a:ext cx="10580040" cy="1879200"/>
+            <a:ext cx="10579680" cy="1878840"/>
           </a:xfrm>
           <a:prstGeom prst="roundRect">
             <a:avLst>
@@ -15416,7 +15416,7 @@
         <p:spPr>
           <a:xfrm>
             <a:off x="542880" y="721800"/>
-            <a:ext cx="10356840" cy="497520"/>
+            <a:ext cx="10356480" cy="497160"/>
           </a:xfrm>
           <a:prstGeom prst="rect">
             <a:avLst/>
@@ -15468,7 +15468,7 @@
         <p:spPr>
           <a:xfrm>
             <a:off x="542880" y="1267200"/>
-            <a:ext cx="10356840" cy="497520"/>
+            <a:ext cx="10356480" cy="497160"/>
           </a:xfrm>
           <a:prstGeom prst="rect">
             <a:avLst/>
@@ -15520,7 +15520,7 @@
         <p:spPr>
           <a:xfrm>
             <a:off x="609480" y="1769400"/>
-            <a:ext cx="10587240" cy="4855320"/>
+            <a:ext cx="10586880" cy="4854960"/>
           </a:xfrm>
           <a:prstGeom prst="rect">
             <a:avLst/>
@@ -15704,7 +15704,7 @@
                 <a:latin typeface="DejaVu Sans"/>
                 <a:ea typeface="DejaVu Sans"/>
               </a:rPr>
-              <a:t>  previous trips</a:t>
+              <a:t>  previous trips.</a:t>
             </a:r>
             <a:endParaRPr b="0" lang="en-US" sz="2000" spc="-1" strike="noStrike">
               <a:latin typeface="DejaVu Sans"/>
@@ -15755,7 +15755,7 @@
         <p:spPr>
           <a:xfrm>
             <a:off x="542880" y="2280240"/>
-            <a:ext cx="10580040" cy="1108800"/>
+            <a:ext cx="10579680" cy="1108440"/>
           </a:xfrm>
           <a:prstGeom prst="roundRect">
             <a:avLst>
@@ -15792,7 +15792,7 @@
         <p:spPr>
           <a:xfrm>
             <a:off x="542880" y="4100760"/>
-            <a:ext cx="10580040" cy="1108800"/>
+            <a:ext cx="10579680" cy="1108440"/>
           </a:xfrm>
           <a:prstGeom prst="roundRect">
             <a:avLst>
@@ -15829,7 +15829,7 @@
         <p:spPr>
           <a:xfrm>
             <a:off x="1145160" y="3526200"/>
-            <a:ext cx="3653640" cy="363960"/>
+            <a:ext cx="3653280" cy="363960"/>
           </a:xfrm>
           <a:prstGeom prst="rect">
             <a:avLst/>
@@ -15881,7 +15881,7 @@
         <p:spPr>
           <a:xfrm>
             <a:off x="1078560" y="2930400"/>
-            <a:ext cx="360" cy="1264680"/>
+            <a:ext cx="360" cy="1264320"/>
           </a:xfrm>
           <a:custGeom>
             <a:avLst/>
@@ -15929,7 +15929,7 @@
         <p:spPr>
           <a:xfrm>
             <a:off x="263520" y="6411600"/>
-            <a:ext cx="10919160" cy="226800"/>
+            <a:ext cx="10918800" cy="226800"/>
           </a:xfrm>
           <a:prstGeom prst="rect">
             <a:avLst/>
@@ -16021,7 +16021,7 @@
         <p:spPr>
           <a:xfrm>
             <a:off x="542880" y="721800"/>
-            <a:ext cx="10356840" cy="497520"/>
+            <a:ext cx="10356480" cy="497160"/>
           </a:xfrm>
           <a:prstGeom prst="rect">
             <a:avLst/>
@@ -16073,7 +16073,7 @@
         <p:spPr>
           <a:xfrm>
             <a:off x="542880" y="1267200"/>
-            <a:ext cx="10356840" cy="497520"/>
+            <a:ext cx="10356480" cy="497160"/>
           </a:xfrm>
           <a:prstGeom prst="rect">
             <a:avLst/>
@@ -16125,7 +16125,7 @@
         <p:spPr>
           <a:xfrm>
             <a:off x="451800" y="1709280"/>
-            <a:ext cx="8224200" cy="4352400"/>
+            <a:ext cx="8223840" cy="4352040"/>
           </a:xfrm>
           <a:prstGeom prst="rect">
             <a:avLst/>
@@ -16155,7 +16155,7 @@
         <p:spPr>
           <a:xfrm>
             <a:off x="609480" y="1769400"/>
-            <a:ext cx="10587240" cy="4855320"/>
+            <a:ext cx="10586880" cy="4854960"/>
           </a:xfrm>
           <a:prstGeom prst="rect">
             <a:avLst/>
@@ -16355,7 +16355,7 @@
         <p:spPr>
           <a:xfrm>
             <a:off x="542880" y="721800"/>
-            <a:ext cx="10356840" cy="497520"/>
+            <a:ext cx="10356480" cy="497160"/>
           </a:xfrm>
           <a:prstGeom prst="rect">
             <a:avLst/>
@@ -16407,7 +16407,7 @@
         <p:spPr>
           <a:xfrm>
             <a:off x="542880" y="1267200"/>
-            <a:ext cx="10356840" cy="497520"/>
+            <a:ext cx="10356480" cy="497160"/>
           </a:xfrm>
           <a:prstGeom prst="rect">
             <a:avLst/>
@@ -16459,7 +16459,7 @@
         <p:spPr>
           <a:xfrm>
             <a:off x="451800" y="1709280"/>
-            <a:ext cx="8224200" cy="4352400"/>
+            <a:ext cx="8223840" cy="4352040"/>
           </a:xfrm>
           <a:prstGeom prst="rect">
             <a:avLst/>
@@ -16485,7 +16485,7 @@
         <p:spPr>
           <a:xfrm>
             <a:off x="263520" y="6411600"/>
-            <a:ext cx="10919160" cy="226800"/>
+            <a:ext cx="10918800" cy="226800"/>
           </a:xfrm>
           <a:prstGeom prst="rect">
             <a:avLst/>
@@ -16551,7 +16551,7 @@
         <p:spPr>
           <a:xfrm>
             <a:off x="2750760" y="1865880"/>
-            <a:ext cx="5925240" cy="4399920"/>
+            <a:ext cx="5924880" cy="4399560"/>
           </a:xfrm>
           <a:prstGeom prst="rect">
             <a:avLst/>
@@ -16569,8 +16569,8 @@
         </p:nvSpPr>
         <p:spPr>
           <a:xfrm rot="16200000">
-            <a:off x="6162120" y="1932480"/>
-            <a:ext cx="68040" cy="59760"/>
+            <a:off x="6162120" y="1932840"/>
+            <a:ext cx="67680" cy="59400"/>
           </a:xfrm>
           <a:prstGeom prst="triangle">
             <a:avLst>
@@ -16609,8 +16609,8 @@
         </p:nvSpPr>
         <p:spPr>
           <a:xfrm rot="16200000">
-            <a:off x="3831120" y="1937880"/>
-            <a:ext cx="68040" cy="59760"/>
+            <a:off x="3831120" y="1938240"/>
+            <a:ext cx="67680" cy="59400"/>
           </a:xfrm>
           <a:prstGeom prst="triangle">
             <a:avLst>
@@ -16649,8 +16649,8 @@
         </p:nvSpPr>
         <p:spPr>
           <a:xfrm rot="16200000">
-            <a:off x="6027840" y="2426400"/>
-            <a:ext cx="68040" cy="59760"/>
+            <a:off x="6027840" y="2426760"/>
+            <a:ext cx="67680" cy="59400"/>
           </a:xfrm>
           <a:prstGeom prst="triangle">
             <a:avLst>
@@ -16720,7 +16720,7 @@
         <p:spPr>
           <a:xfrm>
             <a:off x="542880" y="721800"/>
-            <a:ext cx="10356840" cy="497520"/>
+            <a:ext cx="10356480" cy="497160"/>
           </a:xfrm>
           <a:prstGeom prst="rect">
             <a:avLst/>
@@ -16772,7 +16772,7 @@
         <p:spPr>
           <a:xfrm>
             <a:off x="542880" y="1267200"/>
-            <a:ext cx="10356840" cy="497520"/>
+            <a:ext cx="10356480" cy="497160"/>
           </a:xfrm>
           <a:prstGeom prst="rect">
             <a:avLst/>
@@ -16824,7 +16824,7 @@
         <p:spPr>
           <a:xfrm>
             <a:off x="263520" y="6411600"/>
-            <a:ext cx="10919160" cy="226800"/>
+            <a:ext cx="10918800" cy="226800"/>
           </a:xfrm>
           <a:prstGeom prst="rect">
             <a:avLst/>
@@ -18234,7 +18234,7 @@
         <p:spPr>
           <a:xfrm>
             <a:off x="1456200" y="2734200"/>
-            <a:ext cx="233280" cy="2852640"/>
+            <a:ext cx="232920" cy="2852280"/>
           </a:xfrm>
           <a:prstGeom prst="leftBracket">
             <a:avLst>
@@ -18269,8 +18269,8 @@
         </p:nvSpPr>
         <p:spPr>
           <a:xfrm rot="5400000">
-            <a:off x="6970680" y="-1235160"/>
-            <a:ext cx="233280" cy="7418880"/>
+            <a:off x="6971040" y="-1235160"/>
+            <a:ext cx="232920" cy="7418520"/>
           </a:xfrm>
           <a:prstGeom prst="leftBracket">
             <a:avLst>
@@ -18306,7 +18306,7 @@
         <p:spPr>
           <a:xfrm>
             <a:off x="5811480" y="1957680"/>
-            <a:ext cx="2244960" cy="394560"/>
+            <a:ext cx="2244600" cy="394560"/>
           </a:xfrm>
           <a:prstGeom prst="rect">
             <a:avLst/>
@@ -18358,7 +18358,7 @@
         <p:spPr>
           <a:xfrm>
             <a:off x="0" y="3736080"/>
-            <a:ext cx="1581480" cy="699480"/>
+            <a:ext cx="1581120" cy="699480"/>
           </a:xfrm>
           <a:prstGeom prst="rect">
             <a:avLst/>
@@ -18440,7 +18440,7 @@
         <p:spPr>
           <a:xfrm>
             <a:off x="542880" y="721800"/>
-            <a:ext cx="10356840" cy="497520"/>
+            <a:ext cx="10356480" cy="497160"/>
           </a:xfrm>
           <a:prstGeom prst="rect">
             <a:avLst/>
@@ -18492,7 +18492,7 @@
         <p:spPr>
           <a:xfrm>
             <a:off x="542880" y="1267200"/>
-            <a:ext cx="10356840" cy="497520"/>
+            <a:ext cx="10356480" cy="497160"/>
           </a:xfrm>
           <a:prstGeom prst="rect">
             <a:avLst/>
@@ -18544,7 +18544,7 @@
         <p:spPr>
           <a:xfrm>
             <a:off x="263520" y="6411600"/>
-            <a:ext cx="10919160" cy="226800"/>
+            <a:ext cx="10918800" cy="226800"/>
           </a:xfrm>
           <a:prstGeom prst="rect">
             <a:avLst/>
@@ -20136,7 +20136,7 @@
         <p:spPr>
           <a:xfrm>
             <a:off x="1456200" y="2734200"/>
-            <a:ext cx="233280" cy="2852640"/>
+            <a:ext cx="232920" cy="2852280"/>
           </a:xfrm>
           <a:prstGeom prst="leftBracket">
             <a:avLst>
@@ -20171,8 +20171,8 @@
         </p:nvSpPr>
         <p:spPr>
           <a:xfrm rot="5400000">
-            <a:off x="6970680" y="-1235160"/>
-            <a:ext cx="233280" cy="7418880"/>
+            <a:off x="6971040" y="-1235160"/>
+            <a:ext cx="232920" cy="7418520"/>
           </a:xfrm>
           <a:prstGeom prst="leftBracket">
             <a:avLst>
@@ -20208,7 +20208,7 @@
         <p:spPr>
           <a:xfrm>
             <a:off x="5811480" y="1957680"/>
-            <a:ext cx="2244960" cy="394560"/>
+            <a:ext cx="2244600" cy="394560"/>
           </a:xfrm>
           <a:prstGeom prst="rect">
             <a:avLst/>
@@ -20260,7 +20260,7 @@
         <p:spPr>
           <a:xfrm>
             <a:off x="0" y="3736080"/>
-            <a:ext cx="1581480" cy="699480"/>
+            <a:ext cx="1581120" cy="699480"/>
           </a:xfrm>
           <a:prstGeom prst="rect">
             <a:avLst/>
@@ -20342,7 +20342,7 @@
         <p:spPr>
           <a:xfrm>
             <a:off x="542880" y="721800"/>
-            <a:ext cx="10356840" cy="497520"/>
+            <a:ext cx="10356480" cy="497160"/>
           </a:xfrm>
           <a:prstGeom prst="rect">
             <a:avLst/>
@@ -20394,7 +20394,7 @@
         <p:spPr>
           <a:xfrm>
             <a:off x="542880" y="1267200"/>
-            <a:ext cx="10356840" cy="497520"/>
+            <a:ext cx="10356480" cy="497160"/>
           </a:xfrm>
           <a:prstGeom prst="rect">
             <a:avLst/>
@@ -20446,7 +20446,7 @@
         <p:spPr>
           <a:xfrm>
             <a:off x="451800" y="1709280"/>
-            <a:ext cx="8224200" cy="4352400"/>
+            <a:ext cx="8223840" cy="4352040"/>
           </a:xfrm>
           <a:prstGeom prst="rect">
             <a:avLst/>
@@ -20476,7 +20476,7 @@
         <p:spPr>
           <a:xfrm>
             <a:off x="609480" y="1769400"/>
-            <a:ext cx="10587240" cy="4855320"/>
+            <a:ext cx="10586880" cy="4854960"/>
           </a:xfrm>
           <a:prstGeom prst="rect">
             <a:avLst/>
@@ -20715,7 +20715,7 @@
         <p:spPr>
           <a:xfrm>
             <a:off x="542880" y="721800"/>
-            <a:ext cx="10356840" cy="497520"/>
+            <a:ext cx="10356480" cy="497160"/>
           </a:xfrm>
           <a:prstGeom prst="rect">
             <a:avLst/>
@@ -20767,7 +20767,7 @@
         <p:spPr>
           <a:xfrm>
             <a:off x="542880" y="1267200"/>
-            <a:ext cx="10356840" cy="497520"/>
+            <a:ext cx="10356480" cy="497160"/>
           </a:xfrm>
           <a:prstGeom prst="rect">
             <a:avLst/>
@@ -20819,7 +20819,7 @@
         <p:spPr>
           <a:xfrm>
             <a:off x="451800" y="1709280"/>
-            <a:ext cx="8224200" cy="4352400"/>
+            <a:ext cx="8223840" cy="4352040"/>
           </a:xfrm>
           <a:prstGeom prst="rect">
             <a:avLst/>
@@ -20973,7 +20973,7 @@
         <p:spPr>
           <a:xfrm>
             <a:off x="542880" y="721800"/>
-            <a:ext cx="10356840" cy="497520"/>
+            <a:ext cx="10356480" cy="497160"/>
           </a:xfrm>
           <a:prstGeom prst="rect">
             <a:avLst/>
@@ -21025,7 +21025,7 @@
         <p:spPr>
           <a:xfrm>
             <a:off x="542880" y="1267200"/>
-            <a:ext cx="10356840" cy="497520"/>
+            <a:ext cx="10356480" cy="497160"/>
           </a:xfrm>
           <a:prstGeom prst="rect">
             <a:avLst/>
@@ -21077,7 +21077,7 @@
         <p:spPr>
           <a:xfrm>
             <a:off x="451800" y="1709280"/>
-            <a:ext cx="8224200" cy="4352400"/>
+            <a:ext cx="8223840" cy="4352040"/>
           </a:xfrm>
           <a:prstGeom prst="rect">
             <a:avLst/>
@@ -21107,7 +21107,7 @@
         <p:spPr>
           <a:xfrm>
             <a:off x="609480" y="1769400"/>
-            <a:ext cx="10587240" cy="4855320"/>
+            <a:ext cx="10586880" cy="4854960"/>
           </a:xfrm>
           <a:prstGeom prst="rect">
             <a:avLst/>
@@ -21336,7 +21336,7 @@
         <p:spPr>
           <a:xfrm>
             <a:off x="542880" y="721800"/>
-            <a:ext cx="10356840" cy="497520"/>
+            <a:ext cx="10356480" cy="497160"/>
           </a:xfrm>
           <a:prstGeom prst="rect">
             <a:avLst/>
@@ -21388,7 +21388,7 @@
         <p:spPr>
           <a:xfrm>
             <a:off x="451800" y="1709280"/>
-            <a:ext cx="8224200" cy="4352400"/>
+            <a:ext cx="8223840" cy="4352040"/>
           </a:xfrm>
           <a:prstGeom prst="rect">
             <a:avLst/>
@@ -21414,7 +21414,7 @@
         <p:spPr>
           <a:xfrm>
             <a:off x="542880" y="1267200"/>
-            <a:ext cx="10356840" cy="497520"/>
+            <a:ext cx="10356480" cy="497160"/>
           </a:xfrm>
           <a:prstGeom prst="rect">
             <a:avLst/>
@@ -21470,7 +21470,7 @@
         <p:spPr>
           <a:xfrm>
             <a:off x="4218120" y="871560"/>
-            <a:ext cx="6681600" cy="5419440"/>
+            <a:ext cx="6681240" cy="5419080"/>
           </a:xfrm>
           <a:prstGeom prst="rect">
             <a:avLst/>
@@ -21489,7 +21489,7 @@
         <p:spPr>
           <a:xfrm>
             <a:off x="263520" y="6411600"/>
-            <a:ext cx="10919160" cy="226800"/>
+            <a:ext cx="10918800" cy="226800"/>
           </a:xfrm>
           <a:prstGeom prst="rect">
             <a:avLst/>
@@ -21581,7 +21581,7 @@
         <p:spPr>
           <a:xfrm>
             <a:off x="542880" y="721800"/>
-            <a:ext cx="10356840" cy="497520"/>
+            <a:ext cx="10356480" cy="497160"/>
           </a:xfrm>
           <a:prstGeom prst="rect">
             <a:avLst/>
@@ -21633,7 +21633,7 @@
         <p:spPr>
           <a:xfrm>
             <a:off x="542880" y="1267200"/>
-            <a:ext cx="10356840" cy="497520"/>
+            <a:ext cx="10356480" cy="497160"/>
           </a:xfrm>
           <a:prstGeom prst="rect">
             <a:avLst/>
@@ -21685,7 +21685,7 @@
         <p:spPr>
           <a:xfrm>
             <a:off x="451800" y="1709280"/>
-            <a:ext cx="8224200" cy="4352400"/>
+            <a:ext cx="8223840" cy="4352040"/>
           </a:xfrm>
           <a:prstGeom prst="rect">
             <a:avLst/>
@@ -21715,7 +21715,7 @@
         <p:spPr>
           <a:xfrm>
             <a:off x="609480" y="1769400"/>
-            <a:ext cx="10587240" cy="4855320"/>
+            <a:ext cx="10586880" cy="4854960"/>
           </a:xfrm>
           <a:prstGeom prst="rect">
             <a:avLst/>
@@ -21886,7 +21886,7 @@
         <p:spPr>
           <a:xfrm>
             <a:off x="335520" y="4406760"/>
-            <a:ext cx="10748520" cy="1357560"/>
+            <a:ext cx="10748160" cy="1357200"/>
           </a:xfrm>
           <a:prstGeom prst="rect">
             <a:avLst/>
@@ -21938,7 +21938,7 @@
         <p:spPr>
           <a:xfrm>
             <a:off x="335520" y="2906640"/>
-            <a:ext cx="10748520" cy="1495440"/>
+            <a:ext cx="10748160" cy="1495080"/>
           </a:xfrm>
           <a:prstGeom prst="rect">
             <a:avLst/>
@@ -21994,7 +21994,7 @@
         <p:spPr>
           <a:xfrm>
             <a:off x="542880" y="721800"/>
-            <a:ext cx="10356840" cy="497520"/>
+            <a:ext cx="10356480" cy="497160"/>
           </a:xfrm>
           <a:prstGeom prst="rect">
             <a:avLst/>
@@ -22046,7 +22046,7 @@
         <p:spPr>
           <a:xfrm>
             <a:off x="451800" y="1709280"/>
-            <a:ext cx="8224200" cy="4352400"/>
+            <a:ext cx="8223840" cy="4352040"/>
           </a:xfrm>
           <a:prstGeom prst="rect">
             <a:avLst/>
@@ -22076,7 +22076,7 @@
         <p:spPr>
           <a:xfrm>
             <a:off x="609480" y="1769400"/>
-            <a:ext cx="10587240" cy="4855320"/>
+            <a:ext cx="10586880" cy="4854960"/>
           </a:xfrm>
           <a:prstGeom prst="rect">
             <a:avLst/>
@@ -22392,7 +22392,7 @@
         <p:spPr>
           <a:xfrm>
             <a:off x="335520" y="1268640"/>
-            <a:ext cx="10745280" cy="5032800"/>
+            <a:ext cx="10744920" cy="5032440"/>
           </a:xfrm>
           <a:prstGeom prst="rect">
             <a:avLst/>
@@ -22450,7 +22450,7 @@
         <p:spPr>
           <a:xfrm>
             <a:off x="335520" y="764640"/>
-            <a:ext cx="10745280" cy="496080"/>
+            <a:ext cx="10744920" cy="495720"/>
           </a:xfrm>
           <a:prstGeom prst="rect">
             <a:avLst/>
@@ -22510,7 +22510,7 @@
         <p:spPr>
           <a:xfrm>
             <a:off x="542880" y="685800"/>
-            <a:ext cx="10356840" cy="497520"/>
+            <a:ext cx="10356480" cy="497160"/>
           </a:xfrm>
           <a:prstGeom prst="rect">
             <a:avLst/>
@@ -22586,7 +22586,7 @@
         <p:spPr>
           <a:xfrm>
             <a:off x="335520" y="4406760"/>
-            <a:ext cx="10748520" cy="1357560"/>
+            <a:ext cx="10748160" cy="1357200"/>
           </a:xfrm>
           <a:prstGeom prst="rect">
             <a:avLst/>
@@ -22638,7 +22638,7 @@
         <p:spPr>
           <a:xfrm>
             <a:off x="335520" y="2906640"/>
-            <a:ext cx="10748520" cy="1495440"/>
+            <a:ext cx="10748160" cy="1495080"/>
           </a:xfrm>
           <a:prstGeom prst="rect">
             <a:avLst/>
@@ -22694,7 +22694,7 @@
         <p:spPr>
           <a:xfrm>
             <a:off x="542880" y="721800"/>
-            <a:ext cx="10356840" cy="497520"/>
+            <a:ext cx="10356480" cy="497160"/>
           </a:xfrm>
           <a:prstGeom prst="rect">
             <a:avLst/>
@@ -22746,7 +22746,7 @@
         <p:spPr>
           <a:xfrm>
             <a:off x="542880" y="1267200"/>
-            <a:ext cx="10356840" cy="497520"/>
+            <a:ext cx="10356480" cy="497160"/>
           </a:xfrm>
           <a:prstGeom prst="rect">
             <a:avLst/>
@@ -22798,7 +22798,7 @@
         <p:spPr>
           <a:xfrm>
             <a:off x="451800" y="1709280"/>
-            <a:ext cx="8224200" cy="4352400"/>
+            <a:ext cx="8223840" cy="4352040"/>
           </a:xfrm>
           <a:prstGeom prst="rect">
             <a:avLst/>
@@ -22828,7 +22828,7 @@
         <p:spPr>
           <a:xfrm>
             <a:off x="609480" y="1769400"/>
-            <a:ext cx="10587240" cy="4855320"/>
+            <a:ext cx="10586880" cy="4854960"/>
           </a:xfrm>
           <a:prstGeom prst="rect">
             <a:avLst/>
@@ -22910,7 +22910,7 @@
         <p:spPr>
           <a:xfrm>
             <a:off x="602640" y="3174480"/>
-            <a:ext cx="10580040" cy="1879200"/>
+            <a:ext cx="10579680" cy="1878840"/>
           </a:xfrm>
           <a:prstGeom prst="roundRect">
             <a:avLst>
@@ -22977,7 +22977,7 @@
         <p:spPr>
           <a:xfrm>
             <a:off x="542880" y="721800"/>
-            <a:ext cx="10356840" cy="497520"/>
+            <a:ext cx="10356480" cy="497160"/>
           </a:xfrm>
           <a:prstGeom prst="rect">
             <a:avLst/>
@@ -23029,7 +23029,7 @@
         <p:spPr>
           <a:xfrm>
             <a:off x="542880" y="1267200"/>
-            <a:ext cx="10356840" cy="497520"/>
+            <a:ext cx="10356480" cy="497160"/>
           </a:xfrm>
           <a:prstGeom prst="rect">
             <a:avLst/>
@@ -23081,7 +23081,7 @@
         <p:spPr>
           <a:xfrm>
             <a:off x="451800" y="1709280"/>
-            <a:ext cx="8224200" cy="4352400"/>
+            <a:ext cx="8223840" cy="4352040"/>
           </a:xfrm>
           <a:prstGeom prst="rect">
             <a:avLst/>
@@ -23111,7 +23111,7 @@
         <p:spPr>
           <a:xfrm>
             <a:off x="588240" y="1769400"/>
-            <a:ext cx="10608480" cy="4638240"/>
+            <a:ext cx="10608120" cy="4637880"/>
           </a:xfrm>
           <a:prstGeom prst="rect">
             <a:avLst/>
@@ -23173,7 +23173,7 @@
         <p:spPr>
           <a:xfrm>
             <a:off x="602640" y="3174480"/>
-            <a:ext cx="10580040" cy="1879200"/>
+            <a:ext cx="10579680" cy="1878840"/>
           </a:xfrm>
           <a:prstGeom prst="roundRect">
             <a:avLst>
@@ -23210,7 +23210,7 @@
         <p:spPr>
           <a:xfrm>
             <a:off x="263520" y="6411600"/>
-            <a:ext cx="10919160" cy="226800"/>
+            <a:ext cx="10918800" cy="226800"/>
           </a:xfrm>
           <a:prstGeom prst="rect">
             <a:avLst/>
@@ -23302,7 +23302,7 @@
         <p:spPr>
           <a:xfrm>
             <a:off x="542880" y="721800"/>
-            <a:ext cx="10356840" cy="497520"/>
+            <a:ext cx="10356480" cy="497160"/>
           </a:xfrm>
           <a:prstGeom prst="rect">
             <a:avLst/>
@@ -23354,7 +23354,7 @@
         <p:spPr>
           <a:xfrm>
             <a:off x="542880" y="1267200"/>
-            <a:ext cx="10356840" cy="497520"/>
+            <a:ext cx="10356480" cy="497160"/>
           </a:xfrm>
           <a:prstGeom prst="rect">
             <a:avLst/>
@@ -23406,7 +23406,7 @@
         <p:spPr>
           <a:xfrm>
             <a:off x="451800" y="1709280"/>
-            <a:ext cx="8224200" cy="4352400"/>
+            <a:ext cx="8223840" cy="4352040"/>
           </a:xfrm>
           <a:prstGeom prst="rect">
             <a:avLst/>
@@ -23436,7 +23436,7 @@
         <p:spPr>
           <a:xfrm>
             <a:off x="609480" y="1769400"/>
-            <a:ext cx="10587240" cy="4855320"/>
+            <a:ext cx="10586880" cy="4854960"/>
           </a:xfrm>
           <a:prstGeom prst="rect">
             <a:avLst/>
@@ -23723,7 +23723,7 @@
         <p:spPr>
           <a:xfrm>
             <a:off x="542880" y="721800"/>
-            <a:ext cx="10356840" cy="497520"/>
+            <a:ext cx="10356480" cy="497160"/>
           </a:xfrm>
           <a:prstGeom prst="rect">
             <a:avLst/>
@@ -23775,7 +23775,7 @@
         <p:spPr>
           <a:xfrm>
             <a:off x="542880" y="1267200"/>
-            <a:ext cx="10356840" cy="497520"/>
+            <a:ext cx="10356480" cy="497160"/>
           </a:xfrm>
           <a:prstGeom prst="rect">
             <a:avLst/>
@@ -23827,7 +23827,7 @@
         <p:spPr>
           <a:xfrm>
             <a:off x="451800" y="1709280"/>
-            <a:ext cx="8224200" cy="4352400"/>
+            <a:ext cx="8223840" cy="4352040"/>
           </a:xfrm>
           <a:prstGeom prst="rect">
             <a:avLst/>
@@ -23857,7 +23857,7 @@
         <p:spPr>
           <a:xfrm>
             <a:off x="609480" y="1769400"/>
-            <a:ext cx="10587240" cy="4855320"/>
+            <a:ext cx="10586880" cy="4854960"/>
           </a:xfrm>
           <a:prstGeom prst="rect">
             <a:avLst/>
@@ -24144,7 +24144,7 @@
         <p:spPr>
           <a:xfrm>
             <a:off x="542880" y="721800"/>
-            <a:ext cx="10356840" cy="497520"/>
+            <a:ext cx="10356480" cy="497160"/>
           </a:xfrm>
           <a:prstGeom prst="rect">
             <a:avLst/>
@@ -24196,7 +24196,7 @@
         <p:spPr>
           <a:xfrm>
             <a:off x="542880" y="1267200"/>
-            <a:ext cx="10356840" cy="497520"/>
+            <a:ext cx="10356480" cy="497160"/>
           </a:xfrm>
           <a:prstGeom prst="rect">
             <a:avLst/>
@@ -24248,7 +24248,7 @@
         <p:spPr>
           <a:xfrm>
             <a:off x="451800" y="1709280"/>
-            <a:ext cx="8224200" cy="4352400"/>
+            <a:ext cx="8223840" cy="4352040"/>
           </a:xfrm>
           <a:prstGeom prst="rect">
             <a:avLst/>
@@ -24278,7 +24278,7 @@
         <p:spPr>
           <a:xfrm>
             <a:off x="609480" y="1769400"/>
-            <a:ext cx="10587240" cy="4855320"/>
+            <a:ext cx="10586880" cy="4854960"/>
           </a:xfrm>
           <a:prstGeom prst="rect">
             <a:avLst/>

</xml_diff>